<commit_message>
Forgot to update license slide.
</commit_message>
<xml_diff>
--- a/testing-advanced.pptx
+++ b/testing-advanced.pptx
@@ -12,7 +12,7 @@
   </p:handoutMasterIdLst>
   <p:sldIdLst>
     <p:sldId id="631" r:id="rId5"/>
-    <p:sldId id="320" r:id="rId6"/>
+    <p:sldId id="632" r:id="rId6"/>
     <p:sldId id="487" r:id="rId7"/>
     <p:sldId id="465" r:id="rId8"/>
     <p:sldId id="579" r:id="rId9"/>
@@ -267,7 +267,7 @@
           <a:p>
             <a:fld id="{0B842F42-2CE9-4E35-95C1-410DC08A50B1}" type="datetimeFigureOut">
               <a:rPr lang="en-US" smtClean="0"/>
-              <a:t>6/15/2021</a:t>
+              <a:t>6/20/2021</a:t>
             </a:fld>
             <a:endParaRPr lang="en-US"/>
           </a:p>
@@ -432,7 +432,7 @@
           <a:p>
             <a:fld id="{6F282904-F315-4730-8D91-37D99E141A6F}" type="datetimeFigureOut">
               <a:rPr lang="en-US" smtClean="0"/>
-              <a:t>6/15/2021</a:t>
+              <a:t>6/20/2021</a:t>
             </a:fld>
             <a:endParaRPr lang="en-US"/>
           </a:p>
@@ -6230,7 +6230,7 @@
           <a:noFill/>
           <a:extLst>
             <a:ext uri="{909E8E84-426E-40dd-AFC4-6F175D3DCCD1}">
-              <a14:hiddenFill xmlns="" xmlns:a14="http://schemas.microsoft.com/office/drawing/2010/main">
+              <a14:hiddenFill xmlns:a14="http://schemas.microsoft.com/office/drawing/2010/main" xmlns="">
                 <a:solidFill>
                   <a:srgbClr val="FFFFFF"/>
                 </a:solidFill>
@@ -8670,13 +8670,13 @@
             </a:pPr>
             <a:r>
               <a:rPr lang="en-US" sz="1600" b="1" dirty="0"/>
-              <a:t>The requested citation the overall tutorial is: David E. Bernholdt, Anshu Dubey, Rinku K. Gupta, and David M. Rogers, Better Scientific Software tutorial, in Improving Scientific Software conference, online, 2021. DOI: </a:t>
+              <a:t>The requested citation the overall tutorial is: David E. Bernholdt, Anshu Dubey, Patricia A. Grubel, Rinku K. Gupta, and David M. Rogers, Better Scientific Software tutorial, in ISC High Performance, online, 2021. DOI: </a:t>
             </a:r>
             <a:r>
               <a:rPr lang="en-US" sz="1600" b="1" dirty="0">
                 <a:hlinkClick r:id="rId4"/>
               </a:rPr>
-              <a:t>10.6084/m9.figshare.14256257</a:t>
+              <a:t>10.6084/m9.figshare.14642520</a:t>
             </a:r>
             <a:endParaRPr lang="en-US" sz="1600" b="1" dirty="0"/>
           </a:p>
@@ -8718,40 +8718,12 @@
               </a:spcBef>
             </a:pPr>
             <a:r>
+              <a:rPr lang="en-US" sz="1400"/>
+              <a:t>This </a:t>
+            </a:r>
+            <a:r>
               <a:rPr lang="en-US" sz="1400" dirty="0"/>
-              <a:t>Additional contributors include: Mike </a:t>
-            </a:r>
-            <a:r>
-              <a:rPr lang="en-US" sz="1400" dirty="0" err="1"/>
-              <a:t>Heroux</a:t>
-            </a:r>
-            <a:r>
-              <a:rPr lang="en-US" sz="1400" dirty="0"/>
-              <a:t>, Alicia </a:t>
-            </a:r>
-            <a:r>
-              <a:rPr lang="en-US" sz="1400" dirty="0" err="1"/>
-              <a:t>Klinvex</a:t>
-            </a:r>
-            <a:r>
-              <a:rPr lang="en-US" sz="1400" dirty="0"/>
-              <a:t>, Mark Miller, Jared O’Neal, Katherine Riley, David Rogers, Deborah Stevens, James </a:t>
-            </a:r>
-            <a:r>
-              <a:rPr lang="en-US" sz="1400" dirty="0" err="1"/>
-              <a:t>Willenbring</a:t>
-            </a:r>
-            <a:endParaRPr lang="en-US" sz="1400" dirty="0"/>
-          </a:p>
-          <a:p>
-            <a:pPr>
-              <a:spcBef>
-                <a:spcPts val="400"/>
-              </a:spcBef>
-            </a:pPr>
-            <a:r>
-              <a:rPr lang="en-US" sz="1400" dirty="0"/>
-              <a:t>This work was supported by the U.S. Department of Energy Office of Science, Office of Advanced Scientific Computing Research (ASCR), and by the </a:t>
+              <a:t>work was supported by the U.S. Department of Energy Office of Science, Office of Advanced Scientific Computing Research (ASCR), and by the </a:t>
             </a:r>
             <a:r>
               <a:rPr lang="en-US" sz="1400" dirty="0" err="1"/>
@@ -8861,8 +8833,8 @@
         </p:blipFill>
         <p:spPr bwMode="auto">
           <a:xfrm>
-            <a:off x="10249254" y="570111"/>
-            <a:ext cx="1661258" cy="585216"/>
+            <a:off x="10230336" y="879673"/>
+            <a:ext cx="838200" cy="295275"/>
           </a:xfrm>
           <a:prstGeom prst="rect">
             <a:avLst/>
@@ -8882,7 +8854,7 @@
     </p:spTree>
     <p:extLst>
       <p:ext uri="{BB962C8B-B14F-4D97-AF65-F5344CB8AC3E}">
-        <p14:creationId xmlns:p14="http://schemas.microsoft.com/office/powerpoint/2010/main" val="978726433"/>
+        <p14:creationId xmlns:p14="http://schemas.microsoft.com/office/powerpoint/2010/main" val="2031572981"/>
       </p:ext>
     </p:extLst>
   </p:cSld>
@@ -14263,9 +14235,12 @@
 </file>
 
 <file path=customXml/item1.xml><?xml version="1.0" encoding="utf-8"?>
-<p:properties xmlns:p="http://schemas.microsoft.com/office/2006/metadata/properties" xmlns:xsi="http://www.w3.org/2001/XMLSchema-instance" xmlns:pc="http://schemas.microsoft.com/office/infopath/2007/PartnerControls">
-  <documentManagement/>
-</p:properties>
+<?mso-contentType ?>
+<FormTemplates xmlns="http://schemas.microsoft.com/sharepoint/v3/contenttype/forms">
+  <Display>DocumentLibraryForm</Display>
+  <Edit>DocumentLibraryForm</Edit>
+  <New>DocumentLibraryForm</New>
+</FormTemplates>
 </file>
 
 <file path=customXml/item2.xml><?xml version="1.0" encoding="utf-8"?>
@@ -14318,25 +14293,15 @@
 </file>
 
 <file path=customXml/item3.xml><?xml version="1.0" encoding="utf-8"?>
-<?mso-contentType ?>
-<FormTemplates xmlns="http://schemas.microsoft.com/sharepoint/v3/contenttype/forms">
-  <Display>DocumentLibraryForm</Display>
-  <Edit>DocumentLibraryForm</Edit>
-  <New>DocumentLibraryForm</New>
-</FormTemplates>
+<p:properties xmlns:p="http://schemas.microsoft.com/office/2006/metadata/properties" xmlns:xsi="http://www.w3.org/2001/XMLSchema-instance" xmlns:pc="http://schemas.microsoft.com/office/infopath/2007/PartnerControls">
+  <documentManagement/>
+</p:properties>
 </file>
 
 <file path=customXml/itemProps1.xml><?xml version="1.0" encoding="utf-8"?>
-<ds:datastoreItem xmlns:ds="http://schemas.openxmlformats.org/officeDocument/2006/customXml" ds:itemID="{A50EC660-24D0-43A0-AE5E-E274115E726B}">
+<ds:datastoreItem xmlns:ds="http://schemas.openxmlformats.org/officeDocument/2006/customXml" ds:itemID="{19E20559-B232-4371-8690-E3D8007EDB82}">
   <ds:schemaRefs>
-    <ds:schemaRef ds:uri="http://purl.org/dc/elements/1.1/"/>
-    <ds:schemaRef ds:uri="http://schemas.microsoft.com/office/2006/metadata/properties"/>
-    <ds:schemaRef ds:uri="http://purl.org/dc/terms/"/>
-    <ds:schemaRef ds:uri="http://schemas.openxmlformats.org/package/2006/metadata/core-properties"/>
-    <ds:schemaRef ds:uri="http://schemas.microsoft.com/office/2006/documentManagement/types"/>
-    <ds:schemaRef ds:uri="http://www.w3.org/XML/1998/namespace"/>
-    <ds:schemaRef ds:uri="http://purl.org/dc/dcmitype/"/>
-    <ds:schemaRef ds:uri="http://schemas.microsoft.com/office/infopath/2007/PartnerControls"/>
+    <ds:schemaRef ds:uri="http://schemas.microsoft.com/sharepoint/v3/contenttype/forms"/>
   </ds:schemaRefs>
 </ds:datastoreItem>
 </file>
@@ -14357,9 +14322,16 @@
 </file>
 
 <file path=customXml/itemProps3.xml><?xml version="1.0" encoding="utf-8"?>
-<ds:datastoreItem xmlns:ds="http://schemas.openxmlformats.org/officeDocument/2006/customXml" ds:itemID="{19E20559-B232-4371-8690-E3D8007EDB82}">
+<ds:datastoreItem xmlns:ds="http://schemas.openxmlformats.org/officeDocument/2006/customXml" ds:itemID="{A50EC660-24D0-43A0-AE5E-E274115E726B}">
   <ds:schemaRefs>
-    <ds:schemaRef ds:uri="http://schemas.microsoft.com/sharepoint/v3/contenttype/forms"/>
+    <ds:schemaRef ds:uri="http://purl.org/dc/elements/1.1/"/>
+    <ds:schemaRef ds:uri="http://schemas.microsoft.com/office/2006/metadata/properties"/>
+    <ds:schemaRef ds:uri="http://purl.org/dc/terms/"/>
+    <ds:schemaRef ds:uri="http://schemas.openxmlformats.org/package/2006/metadata/core-properties"/>
+    <ds:schemaRef ds:uri="http://schemas.microsoft.com/office/2006/documentManagement/types"/>
+    <ds:schemaRef ds:uri="http://www.w3.org/XML/1998/namespace"/>
+    <ds:schemaRef ds:uri="http://purl.org/dc/dcmitype/"/>
+    <ds:schemaRef ds:uri="http://schemas.microsoft.com/office/infopath/2007/PartnerControls"/>
   </ds:schemaRefs>
 </ds:datastoreItem>
 </file>
</xml_diff>

<commit_message>
Linkify a bunch of URLs
Missed these previously.  If we're going to provide URLs, we ought to make them clickable.

However as I've also added them to the Resources on the web site, I don't feel the need to re-publish for ATPESC.
</commit_message>
<xml_diff>
--- a/testing-advanced.pptx
+++ b/testing-advanced.pptx
@@ -267,7 +267,7 @@
           <a:p>
             <a:fld id="{0B842F42-2CE9-4E35-95C1-410DC08A50B1}" type="datetimeFigureOut">
               <a:rPr lang="en-US" smtClean="0"/>
-              <a:t>8/10/2021</a:t>
+              <a:t>8/11/2021</a:t>
             </a:fld>
             <a:endParaRPr lang="en-US"/>
           </a:p>
@@ -432,7 +432,7 @@
           <a:p>
             <a:fld id="{6F282904-F315-4730-8D91-37D99E141A6F}" type="datetimeFigureOut">
               <a:rPr lang="en-US" smtClean="0"/>
-              <a:t>8/10/2021</a:t>
+              <a:t>8/11/2021</a:t>
             </a:fld>
             <a:endParaRPr lang="en-US"/>
           </a:p>
@@ -5914,7 +5914,7 @@
           <a:noFill/>
           <a:extLst>
             <a:ext uri="{909E8E84-426E-40dd-AFC4-6F175D3DCCD1}">
-              <a14:hiddenFill xmlns="" xmlns:a14="http://schemas.microsoft.com/office/drawing/2010/main">
+              <a14:hiddenFill xmlns:a14="http://schemas.microsoft.com/office/drawing/2010/main" xmlns="">
                 <a:solidFill>
                   <a:srgbClr val="FFFFFF"/>
                 </a:solidFill>
@@ -13899,21 +13899,6 @@
 </file>
 
 <file path=customXml/item1.xml><?xml version="1.0" encoding="utf-8"?>
-<?mso-contentType ?>
-<FormTemplates xmlns="http://schemas.microsoft.com/sharepoint/v3/contenttype/forms">
-  <Display>DocumentLibraryForm</Display>
-  <Edit>DocumentLibraryForm</Edit>
-  <New>DocumentLibraryForm</New>
-</FormTemplates>
-</file>
-
-<file path=customXml/item2.xml><?xml version="1.0" encoding="utf-8"?>
-<p:properties xmlns:p="http://schemas.microsoft.com/office/2006/metadata/properties" xmlns:xsi="http://www.w3.org/2001/XMLSchema-instance" xmlns:pc="http://schemas.microsoft.com/office/infopath/2007/PartnerControls">
-  <documentManagement/>
-</p:properties>
-</file>
-
-<file path=customXml/item3.xml><?xml version="1.0" encoding="utf-8"?>
 <ct:contentTypeSchema xmlns:ct="http://schemas.microsoft.com/office/2006/metadata/contentType" xmlns:ma="http://schemas.microsoft.com/office/2006/metadata/properties/metaAttributes" ct:_="" ma:_="" ma:contentTypeName="Document" ma:contentTypeID="0x010100565464437F680748A68B85EB6594EA7D" ma:contentTypeVersion="0" ma:contentTypeDescription="Create a new document." ma:contentTypeScope="" ma:versionID="fe3f4dd58d5914c51cfc6deaa8ad845c">
   <xsd:schema xmlns:xsd="http://www.w3.org/2001/XMLSchema" xmlns:p="http://schemas.microsoft.com/office/2006/metadata/properties" targetNamespace="http://schemas.microsoft.com/office/2006/metadata/properties" ma:root="true" ma:fieldsID="4aeb20c0e3442673af7ee10786458764">
     <xsd:element name="properties">
@@ -13962,10 +13947,32 @@
 </ct:contentTypeSchema>
 </file>
 
+<file path=customXml/item2.xml><?xml version="1.0" encoding="utf-8"?>
+<p:properties xmlns:p="http://schemas.microsoft.com/office/2006/metadata/properties" xmlns:xsi="http://www.w3.org/2001/XMLSchema-instance" xmlns:pc="http://schemas.microsoft.com/office/infopath/2007/PartnerControls">
+  <documentManagement/>
+</p:properties>
+</file>
+
+<file path=customXml/item3.xml><?xml version="1.0" encoding="utf-8"?>
+<?mso-contentType ?>
+<FormTemplates xmlns="http://schemas.microsoft.com/sharepoint/v3/contenttype/forms">
+  <Display>DocumentLibraryForm</Display>
+  <Edit>DocumentLibraryForm</Edit>
+  <New>DocumentLibraryForm</New>
+</FormTemplates>
+</file>
+
 <file path=customXml/itemProps1.xml><?xml version="1.0" encoding="utf-8"?>
-<ds:datastoreItem xmlns:ds="http://schemas.openxmlformats.org/officeDocument/2006/customXml" ds:itemID="{19E20559-B232-4371-8690-E3D8007EDB82}">
+<ds:datastoreItem xmlns:ds="http://schemas.openxmlformats.org/officeDocument/2006/customXml" ds:itemID="{E8DB7DEB-074E-4EE8-9B6E-FD277323109C}">
   <ds:schemaRefs>
-    <ds:schemaRef ds:uri="http://schemas.microsoft.com/sharepoint/v3/contenttype/forms"/>
+    <ds:schemaRef ds:uri="http://schemas.microsoft.com/office/2006/metadata/contentType"/>
+    <ds:schemaRef ds:uri="http://schemas.microsoft.com/office/2006/metadata/properties/metaAttributes"/>
+    <ds:schemaRef ds:uri="http://www.w3.org/2001/XMLSchema"/>
+    <ds:schemaRef ds:uri="http://schemas.microsoft.com/office/2006/metadata/properties"/>
+    <ds:schemaRef ds:uri="http://schemas.openxmlformats.org/package/2006/metadata/core-properties"/>
+    <ds:schemaRef ds:uri="http://purl.org/dc/elements/1.1/"/>
+    <ds:schemaRef ds:uri="http://purl.org/dc/terms/"/>
+    <ds:schemaRef ds:uri="http://schemas.microsoft.com/office/internal/2005/internalDocumentation"/>
   </ds:schemaRefs>
 </ds:datastoreItem>
 </file>
@@ -13986,16 +13993,9 @@
 </file>
 
 <file path=customXml/itemProps3.xml><?xml version="1.0" encoding="utf-8"?>
-<ds:datastoreItem xmlns:ds="http://schemas.openxmlformats.org/officeDocument/2006/customXml" ds:itemID="{E8DB7DEB-074E-4EE8-9B6E-FD277323109C}">
+<ds:datastoreItem xmlns:ds="http://schemas.openxmlformats.org/officeDocument/2006/customXml" ds:itemID="{19E20559-B232-4371-8690-E3D8007EDB82}">
   <ds:schemaRefs>
-    <ds:schemaRef ds:uri="http://schemas.microsoft.com/office/2006/metadata/contentType"/>
-    <ds:schemaRef ds:uri="http://schemas.microsoft.com/office/2006/metadata/properties/metaAttributes"/>
-    <ds:schemaRef ds:uri="http://www.w3.org/2001/XMLSchema"/>
-    <ds:schemaRef ds:uri="http://schemas.microsoft.com/office/2006/metadata/properties"/>
-    <ds:schemaRef ds:uri="http://schemas.openxmlformats.org/package/2006/metadata/core-properties"/>
-    <ds:schemaRef ds:uri="http://purl.org/dc/elements/1.1/"/>
-    <ds:schemaRef ds:uri="http://purl.org/dc/terms/"/>
-    <ds:schemaRef ds:uri="http://schemas.microsoft.com/office/internal/2005/internalDocumentation"/>
+    <ds:schemaRef ds:uri="http://schemas.microsoft.com/sharepoint/v3/contenttype/forms"/>
   </ds:schemaRefs>
 </ds:datastoreItem>
 </file>
</xml_diff>

<commit_message>
advanced testing reworked for SC21
</commit_message>
<xml_diff>
--- a/testing-advanced.pptx
+++ b/testing-advanced.pptx
@@ -5,25 +5,27 @@
     <p:sldMasterId id="2147483935" r:id="rId4"/>
   </p:sldMasterIdLst>
   <p:notesMasterIdLst>
-    <p:notesMasterId r:id="rId18"/>
+    <p:notesMasterId r:id="rId20"/>
   </p:notesMasterIdLst>
   <p:handoutMasterIdLst>
-    <p:handoutMasterId r:id="rId19"/>
+    <p:handoutMasterId r:id="rId21"/>
   </p:handoutMasterIdLst>
   <p:sldIdLst>
     <p:sldId id="631" r:id="rId5"/>
     <p:sldId id="633" r:id="rId6"/>
     <p:sldId id="487" r:id="rId7"/>
     <p:sldId id="465" r:id="rId8"/>
-    <p:sldId id="579" r:id="rId9"/>
-    <p:sldId id="580" r:id="rId10"/>
-    <p:sldId id="299" r:id="rId11"/>
-    <p:sldId id="581" r:id="rId12"/>
-    <p:sldId id="469" r:id="rId13"/>
-    <p:sldId id="472" r:id="rId14"/>
-    <p:sldId id="486" r:id="rId15"/>
-    <p:sldId id="586" r:id="rId16"/>
-    <p:sldId id="632" r:id="rId17"/>
+    <p:sldId id="634" r:id="rId9"/>
+    <p:sldId id="579" r:id="rId10"/>
+    <p:sldId id="580" r:id="rId11"/>
+    <p:sldId id="299" r:id="rId12"/>
+    <p:sldId id="581" r:id="rId13"/>
+    <p:sldId id="635" r:id="rId14"/>
+    <p:sldId id="469" r:id="rId15"/>
+    <p:sldId id="472" r:id="rId16"/>
+    <p:sldId id="486" r:id="rId17"/>
+    <p:sldId id="586" r:id="rId18"/>
+    <p:sldId id="632" r:id="rId19"/>
   </p:sldIdLst>
   <p:sldSz cx="12188825" cy="6858000"/>
   <p:notesSz cx="7010400" cy="9296400"/>
@@ -267,7 +269,7 @@
           <a:p>
             <a:fld id="{0B842F42-2CE9-4E35-95C1-410DC08A50B1}" type="datetimeFigureOut">
               <a:rPr lang="en-US" smtClean="0"/>
-              <a:t>9/1/2021</a:t>
+              <a:t>9/2/21</a:t>
             </a:fld>
             <a:endParaRPr lang="en-US"/>
           </a:p>
@@ -432,7 +434,7 @@
           <a:p>
             <a:fld id="{6F282904-F315-4730-8D91-37D99E141A6F}" type="datetimeFigureOut">
               <a:rPr lang="en-US" smtClean="0"/>
-              <a:t>9/1/2021</a:t>
+              <a:t>9/2/21</a:t>
             </a:fld>
             <a:endParaRPr lang="en-US"/>
           </a:p>
@@ -882,7 +884,7 @@
                 <a:ea typeface="+mn-ea"/>
                 <a:cs typeface="+mn-cs"/>
               </a:rPr>
-              <a:t>This test can be developed further too.  Changing out the uniform grid for an adaptive mesh, or turning on options for re-gridding should reduce the errors.  If this is not the case, there is a way to quickly pinpoint the underlying cause. The thought-process for analyzing test results can work as follows...</a:t>
+              <a:t>Here's another example of verifying the halo exchange on a cell grid.  The test initializes interior cells with a known function, does the halo exchange, and checks whether the guard cell has been properly copied over.  Similarly, a unit test can be written to verify parts of the computations - like computing energy from pressure and temperature.</a:t>
             </a:r>
           </a:p>
         </p:txBody>
@@ -913,7 +915,7 @@
     </p:spTree>
     <p:extLst>
       <p:ext uri="{BB962C8B-B14F-4D97-AF65-F5344CB8AC3E}">
-        <p14:creationId xmlns:p14="http://schemas.microsoft.com/office/powerpoint/2010/main" val="2492424174"/>
+        <p14:creationId xmlns:p14="http://schemas.microsoft.com/office/powerpoint/2010/main" val="2514086208"/>
       </p:ext>
     </p:extLst>
   </p:cSld>
@@ -967,6 +969,23 @@
           <a:bodyPr/>
           <a:lstStyle/>
           <a:p>
+            <a:pPr marL="0" marR="0" lvl="0" indent="0" algn="l" defTabSz="914400" rtl="0" eaLnBrk="1" fontAlgn="auto" latinLnBrk="0" hangingPunct="1">
+              <a:lnSpc>
+                <a:spcPct val="100000"/>
+              </a:lnSpc>
+              <a:spcBef>
+                <a:spcPts val="0"/>
+              </a:spcBef>
+              <a:spcAft>
+                <a:spcPts val="0"/>
+              </a:spcAft>
+              <a:buClrTx/>
+              <a:buSzTx/>
+              <a:buFontTx/>
+              <a:buNone/>
+              <a:tabLst/>
+              <a:defRPr/>
+            </a:pPr>
             <a:r>
               <a:rPr lang="en-US" sz="1200" kern="1200" dirty="0">
                 <a:solidFill>
@@ -977,7 +996,7 @@
                 <a:ea typeface="+mn-ea"/>
                 <a:cs typeface="+mn-cs"/>
               </a:rPr>
-              <a:t>This final example shows a graphical way to "map" areas of your code for testing.  The x-axis shows different kinds of physical models implemented in FLASH.  The y-axis shows functionalities of the code.  List out all your unit tests and example applications, and put each one in one or more squares.  Here, the </a:t>
+              <a:t>Once those basic unit tests are done, we can create a unit test at the next level.  Here, the </a:t>
             </a:r>
             <a:r>
               <a:rPr lang="en-US" sz="1200" kern="1200" dirty="0" err="1">
@@ -1001,12 +1020,10 @@
                 <a:ea typeface="+mn-ea"/>
                 <a:cs typeface="+mn-cs"/>
               </a:rPr>
-              <a:t> test "SV" exercises the hydro, EOS, and particle models on a uniform grid.  This type of map will show you weak-spots in your testing design.  Not every square needs to be covered, though.  It also helps document areas of your code that are needed for each science scenario.</a:t>
-            </a:r>
-          </a:p>
-          <a:p>
-            <a:r>
-              <a:rPr lang="en-US" sz="1200" kern="1200" dirty="0">
+              <a:t> blast wave is simulated using the cell grid and equation of state previously tested.  The </a:t>
+            </a:r>
+            <a:r>
+              <a:rPr lang="en-US" sz="1200" kern="1200" dirty="0" err="1">
                 <a:solidFill>
                   <a:schemeClr val="tx1"/>
                 </a:solidFill>
@@ -1015,7 +1032,19 @@
                 <a:ea typeface="+mn-ea"/>
                 <a:cs typeface="+mn-cs"/>
               </a:rPr>
-              <a:t>This type of map is complementary to code coverage.  If your program is well-structured, there should be some correspondence between this map and the files that coverage shows as "tested".</a:t>
+              <a:t>Sedov</a:t>
+            </a:r>
+            <a:r>
+              <a:rPr lang="en-US" sz="1200" kern="1200" dirty="0">
+                <a:solidFill>
+                  <a:schemeClr val="tx1"/>
+                </a:solidFill>
+                <a:effectLst/>
+                <a:latin typeface="+mn-lt"/>
+                <a:ea typeface="+mn-ea"/>
+                <a:cs typeface="+mn-cs"/>
+              </a:rPr>
+              <a:t> wave has a known analytical solution, which provides an error estimate for the implementation.  Out-of-tolerance errors at this stage indicate a problem specific to hydrodynamics, since the cells and equation of state are already tested.  In addition, plotting errors vs. space and time helps to train graduate students.</a:t>
             </a:r>
           </a:p>
         </p:txBody>
@@ -1038,6 +1067,479 @@
             <a:fld id="{54E672D7-8E2D-4611-973D-F4591A707C34}" type="slidenum">
               <a:rPr lang="en-US" smtClean="0"/>
               <a:t>12</a:t>
+            </a:fld>
+            <a:endParaRPr lang="en-US"/>
+          </a:p>
+        </p:txBody>
+      </p:sp>
+    </p:spTree>
+    <p:extLst>
+      <p:ext uri="{BB962C8B-B14F-4D97-AF65-F5344CB8AC3E}">
+        <p14:creationId xmlns:p14="http://schemas.microsoft.com/office/powerpoint/2010/main" val="1935325995"/>
+      </p:ext>
+    </p:extLst>
+  </p:cSld>
+  <p:clrMapOvr>
+    <a:masterClrMapping/>
+  </p:clrMapOvr>
+</p:notes>
+</file>
+
+<file path=ppt/notesSlides/notesSlide12.xml><?xml version="1.0" encoding="utf-8"?>
+<p:notes xmlns:a="http://schemas.openxmlformats.org/drawingml/2006/main" xmlns:r="http://schemas.openxmlformats.org/officeDocument/2006/relationships" xmlns:p="http://schemas.openxmlformats.org/presentationml/2006/main">
+  <p:cSld>
+    <p:spTree>
+      <p:nvGrpSpPr>
+        <p:cNvPr id="1" name=""/>
+        <p:cNvGrpSpPr/>
+        <p:nvPr/>
+      </p:nvGrpSpPr>
+      <p:grpSpPr>
+        <a:xfrm>
+          <a:off x="0" y="0"/>
+          <a:ext cx="0" cy="0"/>
+          <a:chOff x="0" y="0"/>
+          <a:chExt cx="0" cy="0"/>
+        </a:xfrm>
+      </p:grpSpPr>
+      <p:sp>
+        <p:nvSpPr>
+          <p:cNvPr id="2" name="Slide Image Placeholder 1"/>
+          <p:cNvSpPr>
+            <a:spLocks noGrp="1" noRot="1" noChangeAspect="1"/>
+          </p:cNvSpPr>
+          <p:nvPr>
+            <p:ph type="sldImg"/>
+          </p:nvPr>
+        </p:nvSpPr>
+        <p:spPr/>
+      </p:sp>
+      <p:sp>
+        <p:nvSpPr>
+          <p:cNvPr id="3" name="Notes Placeholder 2"/>
+          <p:cNvSpPr>
+            <a:spLocks noGrp="1"/>
+          </p:cNvSpPr>
+          <p:nvPr>
+            <p:ph type="body" idx="1"/>
+          </p:nvPr>
+        </p:nvSpPr>
+        <p:spPr/>
+        <p:txBody>
+          <a:bodyPr/>
+          <a:lstStyle/>
+          <a:p>
+            <a:pPr marL="0" marR="0" lvl="0" indent="0" algn="l" defTabSz="914400" rtl="0" eaLnBrk="1" fontAlgn="auto" latinLnBrk="0" hangingPunct="1">
+              <a:lnSpc>
+                <a:spcPct val="100000"/>
+              </a:lnSpc>
+              <a:spcBef>
+                <a:spcPts val="0"/>
+              </a:spcBef>
+              <a:spcAft>
+                <a:spcPts val="0"/>
+              </a:spcAft>
+              <a:buClrTx/>
+              <a:buSzTx/>
+              <a:buFontTx/>
+              <a:buNone/>
+              <a:tabLst/>
+              <a:defRPr/>
+            </a:pPr>
+            <a:r>
+              <a:rPr lang="en-US" sz="1200" kern="1200" dirty="0">
+                <a:solidFill>
+                  <a:schemeClr val="tx1"/>
+                </a:solidFill>
+                <a:effectLst/>
+                <a:latin typeface="+mn-lt"/>
+                <a:ea typeface="+mn-ea"/>
+                <a:cs typeface="+mn-cs"/>
+              </a:rPr>
+              <a:t>This test can be developed further too.  For example, if one is using AMR in the code, then the steps shown here can become tests for specific AMR functionalities in the code. </a:t>
+            </a:r>
+          </a:p>
+          <a:p>
+            <a:pPr marL="0" marR="0" lvl="0" indent="0" algn="l" defTabSz="914400" rtl="0" eaLnBrk="1" fontAlgn="auto" latinLnBrk="0" hangingPunct="1">
+              <a:lnSpc>
+                <a:spcPct val="100000"/>
+              </a:lnSpc>
+              <a:spcBef>
+                <a:spcPts val="0"/>
+              </a:spcBef>
+              <a:spcAft>
+                <a:spcPts val="0"/>
+              </a:spcAft>
+              <a:buClrTx/>
+              <a:buSzTx/>
+              <a:buFontTx/>
+              <a:buNone/>
+              <a:tabLst/>
+              <a:defRPr/>
+            </a:pPr>
+            <a:r>
+              <a:rPr lang="en-US" sz="1200" kern="1200" dirty="0">
+                <a:solidFill>
+                  <a:schemeClr val="tx1"/>
+                </a:solidFill>
+                <a:effectLst/>
+                <a:latin typeface="+mn-lt"/>
+                <a:ea typeface="+mn-ea"/>
+                <a:cs typeface="+mn-cs"/>
+              </a:rPr>
+              <a:t>Run </a:t>
+            </a:r>
+            <a:r>
+              <a:rPr lang="en-US" sz="1200" kern="1200" dirty="0" err="1">
+                <a:solidFill>
+                  <a:schemeClr val="tx1"/>
+                </a:solidFill>
+                <a:effectLst/>
+                <a:latin typeface="+mn-lt"/>
+                <a:ea typeface="+mn-ea"/>
+                <a:cs typeface="+mn-cs"/>
+              </a:rPr>
+              <a:t>Gcfill</a:t>
+            </a:r>
+            <a:r>
+              <a:rPr lang="en-US" sz="1200" kern="1200" dirty="0">
+                <a:solidFill>
+                  <a:schemeClr val="tx1"/>
+                </a:solidFill>
+                <a:effectLst/>
+                <a:latin typeface="+mn-lt"/>
+                <a:ea typeface="+mn-ea"/>
+                <a:cs typeface="+mn-cs"/>
+              </a:rPr>
+              <a:t> and EOS with AMR and </a:t>
+            </a:r>
+            <a:r>
+              <a:rPr lang="en-US" sz="1200" kern="1200" dirty="0" err="1">
+                <a:solidFill>
+                  <a:schemeClr val="tx1"/>
+                </a:solidFill>
+                <a:effectLst/>
+                <a:latin typeface="+mn-lt"/>
+                <a:ea typeface="+mn-ea"/>
+                <a:cs typeface="+mn-cs"/>
+              </a:rPr>
+              <a:t>sedov</a:t>
+            </a:r>
+            <a:r>
+              <a:rPr lang="en-US" sz="1200" kern="1200" dirty="0">
+                <a:solidFill>
+                  <a:schemeClr val="tx1"/>
+                </a:solidFill>
+                <a:effectLst/>
+                <a:latin typeface="+mn-lt"/>
+                <a:ea typeface="+mn-ea"/>
+                <a:cs typeface="+mn-cs"/>
+              </a:rPr>
+              <a:t> with UG. If all three pass, run </a:t>
+            </a:r>
+            <a:r>
+              <a:rPr lang="en-US" sz="1200" kern="1200" dirty="0" err="1">
+                <a:solidFill>
+                  <a:schemeClr val="tx1"/>
+                </a:solidFill>
+                <a:effectLst/>
+                <a:latin typeface="+mn-lt"/>
+                <a:ea typeface="+mn-ea"/>
+                <a:cs typeface="+mn-cs"/>
+              </a:rPr>
+              <a:t>sedov</a:t>
+            </a:r>
+            <a:r>
+              <a:rPr lang="en-US" sz="1200" kern="1200" dirty="0">
+                <a:solidFill>
+                  <a:schemeClr val="tx1"/>
+                </a:solidFill>
+                <a:effectLst/>
+                <a:latin typeface="+mn-lt"/>
+                <a:ea typeface="+mn-ea"/>
+                <a:cs typeface="+mn-cs"/>
+              </a:rPr>
+              <a:t> with no dynamic refinement. The only new AMR feature exercised in this configuration is reconciliation of fluxes at fine-coarse boundaries.</a:t>
+            </a:r>
+          </a:p>
+          <a:p>
+            <a:pPr marL="0" marR="0" lvl="0" indent="0" algn="l" defTabSz="914400" rtl="0" eaLnBrk="1" fontAlgn="auto" latinLnBrk="0" hangingPunct="1">
+              <a:lnSpc>
+                <a:spcPct val="100000"/>
+              </a:lnSpc>
+              <a:spcBef>
+                <a:spcPts val="0"/>
+              </a:spcBef>
+              <a:spcAft>
+                <a:spcPts val="0"/>
+              </a:spcAft>
+              <a:buClrTx/>
+              <a:buSzTx/>
+              <a:buFontTx/>
+              <a:buNone/>
+              <a:tabLst/>
+              <a:defRPr/>
+            </a:pPr>
+            <a:r>
+              <a:rPr lang="en-US" sz="1200" kern="1200" dirty="0">
+                <a:solidFill>
+                  <a:schemeClr val="tx1"/>
+                </a:solidFill>
+                <a:effectLst/>
+                <a:latin typeface="+mn-lt"/>
+                <a:ea typeface="+mn-ea"/>
+                <a:cs typeface="+mn-cs"/>
+              </a:rPr>
+              <a:t>If that passed run with dynamic refinement, where that is the only new feature added. The basic takeaway is in each new test only one new feature is exercised so that a failure can pin-point the cause.</a:t>
+            </a:r>
+          </a:p>
+        </p:txBody>
+      </p:sp>
+      <p:sp>
+        <p:nvSpPr>
+          <p:cNvPr id="4" name="Slide Number Placeholder 3"/>
+          <p:cNvSpPr>
+            <a:spLocks noGrp="1"/>
+          </p:cNvSpPr>
+          <p:nvPr>
+            <p:ph type="sldNum" sz="quarter" idx="5"/>
+          </p:nvPr>
+        </p:nvSpPr>
+        <p:spPr/>
+        <p:txBody>
+          <a:bodyPr/>
+          <a:lstStyle/>
+          <a:p>
+            <a:fld id="{54E672D7-8E2D-4611-973D-F4591A707C34}" type="slidenum">
+              <a:rPr lang="en-US" smtClean="0"/>
+              <a:t>13</a:t>
+            </a:fld>
+            <a:endParaRPr lang="en-US"/>
+          </a:p>
+        </p:txBody>
+      </p:sp>
+    </p:spTree>
+    <p:extLst>
+      <p:ext uri="{BB962C8B-B14F-4D97-AF65-F5344CB8AC3E}">
+        <p14:creationId xmlns:p14="http://schemas.microsoft.com/office/powerpoint/2010/main" val="2492424174"/>
+      </p:ext>
+    </p:extLst>
+  </p:cSld>
+  <p:clrMapOvr>
+    <a:masterClrMapping/>
+  </p:clrMapOvr>
+</p:notes>
+</file>
+
+<file path=ppt/notesSlides/notesSlide13.xml><?xml version="1.0" encoding="utf-8"?>
+<p:notes xmlns:a="http://schemas.openxmlformats.org/drawingml/2006/main" xmlns:r="http://schemas.openxmlformats.org/officeDocument/2006/relationships" xmlns:p="http://schemas.openxmlformats.org/presentationml/2006/main">
+  <p:cSld>
+    <p:spTree>
+      <p:nvGrpSpPr>
+        <p:cNvPr id="1" name=""/>
+        <p:cNvGrpSpPr/>
+        <p:nvPr/>
+      </p:nvGrpSpPr>
+      <p:grpSpPr>
+        <a:xfrm>
+          <a:off x="0" y="0"/>
+          <a:ext cx="0" cy="0"/>
+          <a:chOff x="0" y="0"/>
+          <a:chExt cx="0" cy="0"/>
+        </a:xfrm>
+      </p:grpSpPr>
+      <p:sp>
+        <p:nvSpPr>
+          <p:cNvPr id="2" name="Slide Image Placeholder 1"/>
+          <p:cNvSpPr>
+            <a:spLocks noGrp="1" noRot="1" noChangeAspect="1"/>
+          </p:cNvSpPr>
+          <p:nvPr>
+            <p:ph type="sldImg"/>
+          </p:nvPr>
+        </p:nvSpPr>
+        <p:spPr/>
+      </p:sp>
+      <p:sp>
+        <p:nvSpPr>
+          <p:cNvPr id="3" name="Notes Placeholder 2"/>
+          <p:cNvSpPr>
+            <a:spLocks noGrp="1"/>
+          </p:cNvSpPr>
+          <p:nvPr>
+            <p:ph type="body" idx="1"/>
+          </p:nvPr>
+        </p:nvSpPr>
+        <p:spPr/>
+        <p:txBody>
+          <a:bodyPr/>
+          <a:lstStyle/>
+          <a:p>
+            <a:r>
+              <a:rPr lang="en-US" sz="1200" kern="1200" dirty="0">
+                <a:solidFill>
+                  <a:schemeClr val="tx1"/>
+                </a:solidFill>
+                <a:effectLst/>
+                <a:latin typeface="+mn-lt"/>
+                <a:ea typeface="+mn-ea"/>
+                <a:cs typeface="+mn-cs"/>
+              </a:rPr>
+              <a:t>This final example shows a graphical way to "map" areas of your code for testing.  The x-axis has physical </a:t>
+            </a:r>
+            <a:r>
+              <a:rPr lang="en-US" sz="1200" kern="1200" dirty="0" err="1">
+                <a:solidFill>
+                  <a:schemeClr val="tx1"/>
+                </a:solidFill>
+                <a:effectLst/>
+                <a:latin typeface="+mn-lt"/>
+                <a:ea typeface="+mn-ea"/>
+                <a:cs typeface="+mn-cs"/>
+              </a:rPr>
+              <a:t>capabiliies</a:t>
+            </a:r>
+            <a:r>
+              <a:rPr lang="en-US" sz="1200" kern="1200" dirty="0">
+                <a:solidFill>
+                  <a:schemeClr val="tx1"/>
+                </a:solidFill>
+                <a:effectLst/>
+                <a:latin typeface="+mn-lt"/>
+                <a:ea typeface="+mn-ea"/>
+                <a:cs typeface="+mn-cs"/>
+              </a:rPr>
+              <a:t>.  The y-axis has infrastructure and generic solvers.  List out all test and mark the corresponding squares in the matrix if the two corresponding features are exercised together in the test. For example here SV stands for the </a:t>
+            </a:r>
+            <a:r>
+              <a:rPr lang="en-US" sz="1200" kern="1200" dirty="0" err="1">
+                <a:solidFill>
+                  <a:schemeClr val="tx1"/>
+                </a:solidFill>
+                <a:effectLst/>
+                <a:latin typeface="+mn-lt"/>
+                <a:ea typeface="+mn-ea"/>
+                <a:cs typeface="+mn-cs"/>
+              </a:rPr>
+              <a:t>Sedov</a:t>
+            </a:r>
+            <a:r>
+              <a:rPr lang="en-US" sz="1200" kern="1200" dirty="0">
+                <a:solidFill>
+                  <a:schemeClr val="tx1"/>
+                </a:solidFill>
+                <a:effectLst/>
+                <a:latin typeface="+mn-lt"/>
+                <a:ea typeface="+mn-ea"/>
+                <a:cs typeface="+mn-cs"/>
+              </a:rPr>
+              <a:t> test run with Uniform grid and includes tracer particles. Similarly the </a:t>
+            </a:r>
+            <a:r>
+              <a:rPr lang="en-US" sz="1200" kern="1200" dirty="0" err="1">
+                <a:solidFill>
+                  <a:schemeClr val="tx1"/>
+                </a:solidFill>
+                <a:effectLst/>
+                <a:latin typeface="+mn-lt"/>
+                <a:ea typeface="+mn-ea"/>
+                <a:cs typeface="+mn-cs"/>
+              </a:rPr>
+              <a:t>celluar</a:t>
+            </a:r>
+            <a:r>
+              <a:rPr lang="en-US" sz="1200" kern="1200" dirty="0">
+                <a:solidFill>
+                  <a:schemeClr val="tx1"/>
+                </a:solidFill>
+                <a:effectLst/>
+                <a:latin typeface="+mn-lt"/>
+                <a:ea typeface="+mn-ea"/>
+                <a:cs typeface="+mn-cs"/>
+              </a:rPr>
+              <a:t> test (CL) runs with AMR and also includes nuclear burning and particles in addition to Hydro and EOS.  The idea is to know which of these squares need to be marked to have sufficient amount of interoperability coverage needed by the code.   Not every square needs to be covered, though.  It also helps document areas of your code that are needed for each science scenario.</a:t>
+            </a:r>
+          </a:p>
+          <a:p>
+            <a:r>
+              <a:rPr lang="en-US" sz="1200" kern="1200" dirty="0">
+                <a:solidFill>
+                  <a:schemeClr val="tx1"/>
+                </a:solidFill>
+                <a:effectLst/>
+                <a:latin typeface="+mn-lt"/>
+                <a:ea typeface="+mn-ea"/>
+                <a:cs typeface="+mn-cs"/>
+              </a:rPr>
+              <a:t>This type of map is complementary to code coverage.  If your program is well-structured, there should be some correspondence between this map and the files that coverage shows as "tested".</a:t>
+            </a:r>
+          </a:p>
+          <a:p>
+            <a:endParaRPr lang="en-US" sz="1200" kern="1200" dirty="0">
+              <a:solidFill>
+                <a:schemeClr val="tx1"/>
+              </a:solidFill>
+              <a:effectLst/>
+              <a:latin typeface="+mn-lt"/>
+              <a:ea typeface="+mn-ea"/>
+              <a:cs typeface="+mn-cs"/>
+            </a:endParaRPr>
+          </a:p>
+          <a:p>
+            <a:r>
+              <a:rPr lang="en-US" sz="1200" kern="1200" dirty="0">
+                <a:solidFill>
+                  <a:schemeClr val="tx1"/>
+                </a:solidFill>
+                <a:effectLst/>
+                <a:latin typeface="+mn-lt"/>
+                <a:ea typeface="+mn-ea"/>
+                <a:cs typeface="+mn-cs"/>
+              </a:rPr>
+              <a:t>The Order described here gives guidelines for how to select the tests to maximize the needed coverage while minimizing the cost. It is always desirable to run the fastest and most lightweight tests that can pinpoint the error</a:t>
+            </a:r>
+            <a:r>
+              <a:rPr lang="en-US" sz="1200" kern="1200">
+                <a:solidFill>
+                  <a:schemeClr val="tx1"/>
+                </a:solidFill>
+                <a:effectLst/>
+                <a:latin typeface="+mn-lt"/>
+                <a:ea typeface="+mn-ea"/>
+                <a:cs typeface="+mn-cs"/>
+              </a:rPr>
+              <a:t>. </a:t>
+            </a:r>
+            <a:endParaRPr lang="en-US" sz="1200" kern="1200" dirty="0">
+              <a:solidFill>
+                <a:schemeClr val="tx1"/>
+              </a:solidFill>
+              <a:effectLst/>
+              <a:latin typeface="+mn-lt"/>
+              <a:ea typeface="+mn-ea"/>
+              <a:cs typeface="+mn-cs"/>
+            </a:endParaRPr>
+          </a:p>
+        </p:txBody>
+      </p:sp>
+      <p:sp>
+        <p:nvSpPr>
+          <p:cNvPr id="4" name="Slide Number Placeholder 3"/>
+          <p:cNvSpPr>
+            <a:spLocks noGrp="1"/>
+          </p:cNvSpPr>
+          <p:nvPr>
+            <p:ph type="sldNum" sz="quarter" idx="5"/>
+          </p:nvPr>
+        </p:nvSpPr>
+        <p:spPr/>
+        <p:txBody>
+          <a:bodyPr/>
+          <a:lstStyle/>
+          <a:p>
+            <a:fld id="{54E672D7-8E2D-4611-973D-F4591A707C34}" type="slidenum">
+              <a:rPr lang="en-US" smtClean="0"/>
+              <a:t>14</a:t>
             </a:fld>
             <a:endParaRPr lang="en-US"/>
           </a:p>
@@ -1110,21 +1612,7 @@
                 <a:ea typeface="+mn-ea"/>
                 <a:cs typeface="+mn-cs"/>
               </a:rPr>
-              <a:t>Let's think about this problem as "selecting the right tests."  Taking a step back, there are two 'levels' of tests (regression testing and CI-type tests), and there are multiple 'granularities' of tests (from unit to integration).  Computer scientists tend to gravitate towards tests that run quickly and check data structures, types, definitions, syntax, and error reporting.  These quick tests are great for a continuous integration suite.  Domain scientists tend to think of ways to compare program outputs to external measures - like known solutions and example run cases.  These tests can be long-running, and need interpretation to understand what's going on.  Such tests are often better suited for scheduled testing - which can be set up to run on dedicated servers on a nightly or weekly schedule.</a:t>
-            </a:r>
-          </a:p>
-          <a:p>
-            <a:r>
-              <a:rPr lang="en-US" sz="1200" kern="1200" dirty="0">
-                <a:solidFill>
-                  <a:schemeClr val="tx1"/>
-                </a:solidFill>
-                <a:effectLst/>
-                <a:latin typeface="+mn-lt"/>
-                <a:ea typeface="+mn-ea"/>
-                <a:cs typeface="+mn-cs"/>
-              </a:rPr>
-              <a:t>Since testing is so broad, individual tests can also vary in complexity.  As a rule of thumb, complicated tests get -100 points.  Tests should be as simple as possible, and always provide information on what went wrong.  If a test can't help to diagnose an error condition, it's not a useful test.</a:t>
+              <a:t>Let's think about this problem as "selecting the right tests."  Taking a step back, there are two 'levels' of tests (regression testing and CI-type tests), and there are multiple 'granularities' of tests (from unit to integration).  Computer scientists tend to gravitate towards tests that run quickly and check data structures, types, definitions, syntax, and error reporting.  These quick tests are great for a continuous integration suite.  Domain scientists tend to think of ways to compare program outputs to external measures - like known solutions and example run cases.  These tests can be long-running, and need interpretation to understand what's going on.  Such tests are often better suited for scheduled testing - which can be set up to run on dedicated servers on a nightly or weekly schedule. And there is a range of intermediate levels of testing pertaining to interoperability in component-based software systems, verification of non-trivial functionality such as transparent restart from a checkpoint etc. Since testing is so broad, individual tests can also vary in complexity.  As a rule of thumb, complicated tests get -100 points.  Tests should be as simple as possible, and always provide information on what went wrong.  If a test can't help to diagnose an error condition, it's not a useful test.</a:t>
             </a:r>
           </a:p>
         </p:txBody>
@@ -1224,8 +1712,43 @@
                 <a:ea typeface="+mn-ea"/>
                 <a:cs typeface="+mn-cs"/>
               </a:rPr>
-              <a:t>You might be tempted to get overly creative with test cases, or turn every possible scenario into a test.  This can be counterproductive.  Time spent on creating, maintaining, and interpreting tests takes team resources.  Ideally, tests are closely aligned with the science objectives.  Then the tests themselves provide baselines, and are motivating to create and maintain.  If testing goes too far away from that, it can distract the project away from achieving its next great features.</a:t>
-            </a:r>
+              <a:t>You might be tempted to get overly creative with test cases, or turn every possible scenario into a test.  This can be counterproductive.  Time spent on creating, maintaining, and interpreting tests takes team resources.  Ideally, tests are either  closely aligned with the science objectives for single domain codes, in which case the tests themselves provide baselines, and are motivating to create and maintain.  If testing goes too far away from that, it can distract the project away from achieving its next great features. Or, for  multi-domain general purpose code the collection of tests should maximize coverage while </a:t>
+            </a:r>
+            <a:r>
+              <a:rPr lang="en-US" sz="1200" kern="1200" dirty="0" err="1">
+                <a:solidFill>
+                  <a:schemeClr val="tx1"/>
+                </a:solidFill>
+                <a:effectLst/>
+                <a:latin typeface="+mn-lt"/>
+                <a:ea typeface="+mn-ea"/>
+                <a:cs typeface="+mn-cs"/>
+              </a:rPr>
+              <a:t>minizing</a:t>
+            </a:r>
+            <a:r>
+              <a:rPr lang="en-US" sz="1200" kern="1200" dirty="0">
+                <a:solidFill>
+                  <a:schemeClr val="tx1"/>
+                </a:solidFill>
+                <a:effectLst/>
+                <a:latin typeface="+mn-lt"/>
+                <a:ea typeface="+mn-ea"/>
+                <a:cs typeface="+mn-cs"/>
+              </a:rPr>
+              <a:t> the cost of developing and running the tests.</a:t>
+            </a:r>
+          </a:p>
+          <a:p>
+            <a:endParaRPr lang="en-US" sz="1200" kern="1200" dirty="0">
+              <a:solidFill>
+                <a:schemeClr val="tx1"/>
+              </a:solidFill>
+              <a:effectLst/>
+              <a:latin typeface="+mn-lt"/>
+              <a:ea typeface="+mn-ea"/>
+              <a:cs typeface="+mn-cs"/>
+            </a:endParaRPr>
           </a:p>
           <a:p>
             <a:r>
@@ -1320,7 +1843,12 @@
             <p:ph type="sldImg"/>
           </p:nvPr>
         </p:nvSpPr>
-        <p:spPr/>
+        <p:spPr>
+          <a:xfrm>
+            <a:off x="407988" y="696913"/>
+            <a:ext cx="6194425" cy="3486150"/>
+          </a:xfrm>
+        </p:spPr>
       </p:sp>
       <p:sp>
         <p:nvSpPr>
@@ -1337,23 +1865,6 @@
           <a:bodyPr/>
           <a:lstStyle/>
           <a:p>
-            <a:pPr marL="0" marR="0" lvl="0" indent="0" algn="l" defTabSz="914400" rtl="0" eaLnBrk="1" fontAlgn="auto" latinLnBrk="0" hangingPunct="1">
-              <a:lnSpc>
-                <a:spcPct val="100000"/>
-              </a:lnSpc>
-              <a:spcBef>
-                <a:spcPts val="0"/>
-              </a:spcBef>
-              <a:spcAft>
-                <a:spcPts val="0"/>
-              </a:spcAft>
-              <a:buClrTx/>
-              <a:buSzTx/>
-              <a:buFontTx/>
-              <a:buNone/>
-              <a:tabLst/>
-              <a:defRPr/>
-            </a:pPr>
             <a:r>
               <a:rPr lang="en-US" sz="1200" kern="1200" dirty="0">
                 <a:solidFill>
@@ -1364,10 +1875,12 @@
                 <a:ea typeface="+mn-ea"/>
                 <a:cs typeface="+mn-cs"/>
               </a:rPr>
-              <a:t>OK - now everyone is onboard with your testing plan, and your code is in a good place.  What happens next?  You can double-check your work using a code coverage tool.  You can create a policy on what to do with failed tests and issues marked as "bugs."  It helps to assign responsibility for the test suite - both so that things happen, and also so that you can recognize the hard work put in by that team member.  You should consider your test suite during </a:t>
-            </a:r>
-            <a:r>
-              <a:rPr lang="en-US" sz="1200" kern="1200" dirty="0" err="1">
+              <a:t>For example, users might assume the overlap region between processors is communicated correctly during a halo exchange.  If there's no test that tries this out with varying halo size, there's no way to know when that assumption breaks down.</a:t>
+            </a:r>
+          </a:p>
+          <a:p>
+            <a:r>
+              <a:rPr lang="en-US" sz="1200" kern="1200" dirty="0">
                 <a:solidFill>
                   <a:schemeClr val="tx1"/>
                 </a:solidFill>
@@ -1376,19 +1889,7 @@
                 <a:ea typeface="+mn-ea"/>
                 <a:cs typeface="+mn-cs"/>
               </a:rPr>
-              <a:t>refactorings</a:t>
-            </a:r>
-            <a:r>
-              <a:rPr lang="en-US" sz="1200" kern="1200" dirty="0">
-                <a:solidFill>
-                  <a:schemeClr val="tx1"/>
-                </a:solidFill>
-                <a:effectLst/>
-                <a:latin typeface="+mn-lt"/>
-                <a:ea typeface="+mn-ea"/>
-                <a:cs typeface="+mn-cs"/>
-              </a:rPr>
-              <a:t>, and use it for the code release process.  Cost-effectiveness comes in here because, if you already have defined functionalities and tests, then it's much less likely that your team will get side-tracked by maintaining fixes and patches for past releases.  That is a rabbit-hole nobody wants to go down.</a:t>
+              <a:t>This line of thought leads to the idea of a team meeting focused specifically on creating a "testing plan".  The goal of such a meeting is to clearly map out the expected use of the code.  What parts of the code are critical to long-term stability?  Who on your team should be responsible for ensuring each piece works?  Are there additional difficulties coming from interacting modules?  How can these be reasonably addressed with example use cases?</a:t>
             </a:r>
           </a:p>
         </p:txBody>
@@ -1400,7 +1901,7 @@
             <a:spLocks noGrp="1"/>
           </p:cNvSpPr>
           <p:nvPr>
-            <p:ph type="sldNum" sz="quarter" idx="5"/>
+            <p:ph type="sldNum" sz="quarter" idx="10"/>
           </p:nvPr>
         </p:nvSpPr>
         <p:spPr/>
@@ -1408,7 +1909,7 @@
           <a:bodyPr/>
           <a:lstStyle/>
           <a:p>
-            <a:fld id="{54E672D7-8E2D-4611-973D-F4591A707C34}" type="slidenum">
+            <a:fld id="{A546EF7F-2180-5947-8246-D3E867E2B048}" type="slidenum">
               <a:rPr lang="en-US" smtClean="0"/>
               <a:t>5</a:t>
             </a:fld>
@@ -1419,7 +1920,7 @@
     </p:spTree>
     <p:extLst>
       <p:ext uri="{BB962C8B-B14F-4D97-AF65-F5344CB8AC3E}">
-        <p14:creationId xmlns:p14="http://schemas.microsoft.com/office/powerpoint/2010/main" val="4240883905"/>
+        <p14:creationId xmlns:p14="http://schemas.microsoft.com/office/powerpoint/2010/main" val="1027456559"/>
       </p:ext>
     </p:extLst>
   </p:cSld>
@@ -1500,7 +2001,7 @@
                 <a:ea typeface="+mn-ea"/>
                 <a:cs typeface="+mn-cs"/>
               </a:rPr>
-              <a:t>With those general guidelines in mind, let's get down to some specific examples from the collected experiences of our team members.  Many of these come from </a:t>
+              <a:t>OK - now everyone is onboard with your testing plan, and your code is in a good place.  What happens next?  You can double-check your work using a code coverage tool.  You can create a policy on what to do with failed tests and issues marked as "bugs."  It helps to assign responsibility for the test suite - both so that things happen, and also so that you can recognize the hard work put in by that team member.  You should consider your test suite during </a:t>
             </a:r>
             <a:r>
               <a:rPr lang="en-US" sz="1200" kern="1200" dirty="0" err="1">
@@ -1512,7 +2013,7 @@
                 <a:ea typeface="+mn-ea"/>
                 <a:cs typeface="+mn-cs"/>
               </a:rPr>
-              <a:t>Anshu</a:t>
+              <a:t>refactorings</a:t>
             </a:r>
             <a:r>
               <a:rPr lang="en-US" sz="1200" kern="1200" dirty="0">
@@ -1524,114 +2025,7 @@
                 <a:ea typeface="+mn-ea"/>
                 <a:cs typeface="+mn-cs"/>
               </a:rPr>
-              <a:t> Dubey's work with the E3SM and Flash codes.  Example 1 is an ideal case.  You're developing a new code, and develop your diagnostics as your developing the code itself.  Taking the extra time to harden those diagnostics into a test suite will save you headaches later.  You'll likely have a lot of comparisons against known, expected solutions.  You should try and make things as granular as possible, though.  The scaffolding idea, discussed later, finds a way to "build up" a program, testing each new piece.  Remember to inject errors, so that you know your code will discover </a:t>
-            </a:r>
-            <a:r>
-              <a:rPr lang="en-US" sz="1200" kern="1200" dirty="0" err="1">
-                <a:solidFill>
-                  <a:schemeClr val="tx1"/>
-                </a:solidFill>
-                <a:effectLst/>
-                <a:latin typeface="+mn-lt"/>
-                <a:ea typeface="+mn-ea"/>
-                <a:cs typeface="+mn-cs"/>
-              </a:rPr>
-              <a:t>erroroneous</a:t>
-            </a:r>
-            <a:r>
-              <a:rPr lang="en-US" sz="1200" kern="1200" dirty="0">
-                <a:solidFill>
-                  <a:schemeClr val="tx1"/>
-                </a:solidFill>
-                <a:effectLst/>
-                <a:latin typeface="+mn-lt"/>
-                <a:ea typeface="+mn-ea"/>
-                <a:cs typeface="+mn-cs"/>
-              </a:rPr>
-              <a:t> input correctly.  As the package gets more complex, it's non-trivial to devise good tests.  Nevertheless, good tests are extremely important.</a:t>
-            </a:r>
-          </a:p>
-          <a:p>
-            <a:pPr marL="0" marR="0" lvl="0" indent="0" algn="l" defTabSz="914400" rtl="0" eaLnBrk="1" fontAlgn="auto" latinLnBrk="0" hangingPunct="1">
-              <a:lnSpc>
-                <a:spcPct val="100000"/>
-              </a:lnSpc>
-              <a:spcBef>
-                <a:spcPts val="0"/>
-              </a:spcBef>
-              <a:spcAft>
-                <a:spcPts val="0"/>
-              </a:spcAft>
-              <a:buClrTx/>
-              <a:buSzTx/>
-              <a:buFontTx/>
-              <a:buNone/>
-              <a:tabLst/>
-              <a:defRPr/>
-            </a:pPr>
-            <a:endParaRPr lang="en-US" sz="1200" kern="1200" dirty="0">
-              <a:solidFill>
-                <a:schemeClr val="tx1"/>
-              </a:solidFill>
-              <a:effectLst/>
-              <a:latin typeface="+mn-lt"/>
-              <a:ea typeface="+mn-ea"/>
-              <a:cs typeface="+mn-cs"/>
-            </a:endParaRPr>
-          </a:p>
-          <a:p>
-            <a:pPr marL="0" marR="0" lvl="0" indent="0" algn="l" defTabSz="914400" rtl="0" eaLnBrk="1" fontAlgn="auto" latinLnBrk="0" hangingPunct="1">
-              <a:lnSpc>
-                <a:spcPct val="100000"/>
-              </a:lnSpc>
-              <a:spcBef>
-                <a:spcPts val="0"/>
-              </a:spcBef>
-              <a:spcAft>
-                <a:spcPts val="0"/>
-              </a:spcAft>
-              <a:buClrTx/>
-              <a:buSzTx/>
-              <a:buFontTx/>
-              <a:buNone/>
-              <a:tabLst/>
-              <a:defRPr/>
-            </a:pPr>
-            <a:r>
-              <a:rPr lang="en-US" sz="1200" kern="1200" dirty="0">
-                <a:solidFill>
-                  <a:schemeClr val="tx1"/>
-                </a:solidFill>
-                <a:effectLst/>
-                <a:latin typeface="+mn-lt"/>
-                <a:ea typeface="+mn-ea"/>
-                <a:cs typeface="+mn-cs"/>
-              </a:rPr>
-              <a:t>Proper testing procedures can also help encourage new contributors.  Only recently, I had this experience contributing a feature to the "</a:t>
-            </a:r>
-            <a:r>
-              <a:rPr lang="en-US" sz="1200" kern="1200" dirty="0" err="1">
-                <a:solidFill>
-                  <a:schemeClr val="tx1"/>
-                </a:solidFill>
-                <a:effectLst/>
-                <a:latin typeface="+mn-lt"/>
-                <a:ea typeface="+mn-ea"/>
-                <a:cs typeface="+mn-cs"/>
-              </a:rPr>
-              <a:t>alpaka</a:t>
-            </a:r>
-            <a:r>
-              <a:rPr lang="en-US" sz="1200" kern="1200" dirty="0">
-                <a:solidFill>
-                  <a:schemeClr val="tx1"/>
-                </a:solidFill>
-                <a:effectLst/>
-                <a:latin typeface="+mn-lt"/>
-                <a:ea typeface="+mn-ea"/>
-                <a:cs typeface="+mn-cs"/>
-              </a:rPr>
-              <a:t>" code.  The first thing I did was check that the team wanted the feature.  Then I ran their test suite locally.  Everything worked, and then I could build my feature one line at a time – testing everything.  When I finally pushed it to the main repository, I was sure it was something the team onboard with, and that could be easily shown to work well.</a:t>
+              <a:t>, and use it for the code release process.  Cost-effectiveness comes in here because, if you already have defined functionalities and tests, then it's much less likely that your team will get side-tracked by maintaining fixes and patches for past releases.  That is a rabbit-hole nobody wants to go down.</a:t>
             </a:r>
           </a:p>
         </p:txBody>
@@ -1662,7 +2056,7 @@
     </p:spTree>
     <p:extLst>
       <p:ext uri="{BB962C8B-B14F-4D97-AF65-F5344CB8AC3E}">
-        <p14:creationId xmlns:p14="http://schemas.microsoft.com/office/powerpoint/2010/main" val="1900866051"/>
+        <p14:creationId xmlns:p14="http://schemas.microsoft.com/office/powerpoint/2010/main" val="4240883905"/>
       </p:ext>
     </p:extLst>
   </p:cSld>
@@ -1716,6 +2110,23 @@
           <a:bodyPr/>
           <a:lstStyle/>
           <a:p>
+            <a:pPr marL="0" marR="0" lvl="0" indent="0" algn="l" defTabSz="914400" rtl="0" eaLnBrk="1" fontAlgn="auto" latinLnBrk="0" hangingPunct="1">
+              <a:lnSpc>
+                <a:spcPct val="100000"/>
+              </a:lnSpc>
+              <a:spcBef>
+                <a:spcPts val="0"/>
+              </a:spcBef>
+              <a:spcAft>
+                <a:spcPts val="0"/>
+              </a:spcAft>
+              <a:buClrTx/>
+              <a:buSzTx/>
+              <a:buFontTx/>
+              <a:buNone/>
+              <a:tabLst/>
+              <a:defRPr/>
+            </a:pPr>
             <a:r>
               <a:rPr lang="en-US" sz="1200" kern="1200" dirty="0">
                 <a:solidFill>
@@ -1726,7 +2137,7 @@
                 <a:ea typeface="+mn-ea"/>
                 <a:cs typeface="+mn-cs"/>
               </a:rPr>
-              <a:t>Here's an example from the E3SM code, the </a:t>
+              <a:t>With those general guidelines in mind, let's get down to some specific examples from the collected experiences of our team members.  Many of these come from </a:t>
             </a:r>
             <a:r>
               <a:rPr lang="en-US" sz="1200" kern="1200" dirty="0" err="1">
@@ -1738,7 +2149,7 @@
                 <a:ea typeface="+mn-ea"/>
                 <a:cs typeface="+mn-cs"/>
               </a:rPr>
-              <a:t>Exascale</a:t>
+              <a:t>Anshu</a:t>
             </a:r>
             <a:r>
               <a:rPr lang="en-US" sz="1200" kern="1200" dirty="0">
@@ -1750,12 +2161,10 @@
                 <a:ea typeface="+mn-ea"/>
                 <a:cs typeface="+mn-cs"/>
               </a:rPr>
-              <a:t> Earth System Model.  Although advanced now, it originated in a combination of Fortran codes dealing with various aspects of climate modeling.  As a combination of many modules, it was difficult to create an overall testing strategy.</a:t>
-            </a:r>
-          </a:p>
-          <a:p>
-            <a:r>
-              <a:rPr lang="en-US" sz="1200" kern="1200" dirty="0">
+              <a:t> Dubey's work with the E3SM and Flash codes.  Example 1 is an ideal case.  You're developing a new code, and develop your diagnostics as your developing the code itself.  Taking the extra time to harden those diagnostics into a test suite will save you headaches later.  You'll likely have a lot of comparisons against known, expected solutions.  You should try and make things as granular as possible, though.  The scaffolding idea, discussed later, finds a way to "build up" a program, testing each new piece.  Remember to inject errors, so that you know your code will discover </a:t>
+            </a:r>
+            <a:r>
+              <a:rPr lang="en-US" sz="1200" kern="1200" dirty="0" err="1">
                 <a:solidFill>
                   <a:schemeClr val="tx1"/>
                 </a:solidFill>
@@ -1764,10 +2173,8 @@
                 <a:ea typeface="+mn-ea"/>
                 <a:cs typeface="+mn-cs"/>
               </a:rPr>
-              <a:t>a) Separate a unit.</a:t>
-            </a:r>
-          </a:p>
-          <a:p>
+              <a:t>erroroneous</a:t>
+            </a:r>
             <a:r>
               <a:rPr lang="en-US" sz="1200" kern="1200" dirty="0">
                 <a:solidFill>
@@ -1778,10 +2185,55 @@
                 <a:ea typeface="+mn-ea"/>
                 <a:cs typeface="+mn-cs"/>
               </a:rPr>
-              <a:t>b) Capture the state of the program inputting to that unit.</a:t>
-            </a:r>
-          </a:p>
-          <a:p>
+              <a:t> input correctly.  As the package gets more complex, it's non-trivial to devise good tests.  Nevertheless, good tests are extremely important.</a:t>
+            </a:r>
+          </a:p>
+          <a:p>
+            <a:pPr marL="0" marR="0" lvl="0" indent="0" algn="l" defTabSz="914400" rtl="0" eaLnBrk="1" fontAlgn="auto" latinLnBrk="0" hangingPunct="1">
+              <a:lnSpc>
+                <a:spcPct val="100000"/>
+              </a:lnSpc>
+              <a:spcBef>
+                <a:spcPts val="0"/>
+              </a:spcBef>
+              <a:spcAft>
+                <a:spcPts val="0"/>
+              </a:spcAft>
+              <a:buClrTx/>
+              <a:buSzTx/>
+              <a:buFontTx/>
+              <a:buNone/>
+              <a:tabLst/>
+              <a:defRPr/>
+            </a:pPr>
+            <a:endParaRPr lang="en-US" sz="1200" kern="1200" dirty="0">
+              <a:solidFill>
+                <a:schemeClr val="tx1"/>
+              </a:solidFill>
+              <a:effectLst/>
+              <a:latin typeface="+mn-lt"/>
+              <a:ea typeface="+mn-ea"/>
+              <a:cs typeface="+mn-cs"/>
+            </a:endParaRPr>
+          </a:p>
+          <a:p>
+            <a:pPr marL="0" marR="0" lvl="0" indent="0" algn="l" defTabSz="914400" rtl="0" eaLnBrk="1" fontAlgn="auto" latinLnBrk="0" hangingPunct="1">
+              <a:lnSpc>
+                <a:spcPct val="100000"/>
+              </a:lnSpc>
+              <a:spcBef>
+                <a:spcPts val="0"/>
+              </a:spcBef>
+              <a:spcAft>
+                <a:spcPts val="0"/>
+              </a:spcAft>
+              <a:buClrTx/>
+              <a:buSzTx/>
+              <a:buFontTx/>
+              <a:buNone/>
+              <a:tabLst/>
+              <a:defRPr/>
+            </a:pPr>
             <a:r>
               <a:rPr lang="en-US" sz="1200" kern="1200" dirty="0">
                 <a:solidFill>
@@ -1792,12 +2244,10 @@
                 <a:ea typeface="+mn-ea"/>
                 <a:cs typeface="+mn-cs"/>
               </a:rPr>
-              <a:t>c) Create a test driver to load the state and exercise the unit.</a:t>
-            </a:r>
-          </a:p>
-          <a:p>
-            <a:r>
-              <a:rPr lang="en-US" sz="1200" kern="1200" dirty="0">
+              <a:t>Proper testing procedures can also help encourage new contributors.  Only recently, I had this experience contributing a feature to the "</a:t>
+            </a:r>
+            <a:r>
+              <a:rPr lang="en-US" sz="1200" kern="1200" dirty="0" err="1">
                 <a:solidFill>
                   <a:schemeClr val="tx1"/>
                 </a:solidFill>
@@ -1806,10 +2256,10 @@
                 <a:ea typeface="+mn-ea"/>
                 <a:cs typeface="+mn-cs"/>
               </a:rPr>
-              <a:t>d) If extra functions from the code were accessed, these were </a:t>
-            </a:r>
-            <a:r>
-              <a:rPr lang="en-US" sz="1200" kern="1200" dirty="0" err="1">
+              <a:t>alpaka</a:t>
+            </a:r>
+            <a:r>
+              <a:rPr lang="en-US" sz="1200" kern="1200" dirty="0">
                 <a:solidFill>
                   <a:schemeClr val="tx1"/>
                 </a:solidFill>
@@ -1818,47 +2268,7 @@
                 <a:ea typeface="+mn-ea"/>
                 <a:cs typeface="+mn-cs"/>
               </a:rPr>
-              <a:t>sym</a:t>
-            </a:r>
-            <a:r>
-              <a:rPr lang="en-US" sz="1200" kern="1200" dirty="0">
-                <a:solidFill>
-                  <a:schemeClr val="tx1"/>
-                </a:solidFill>
-                <a:effectLst/>
-                <a:latin typeface="+mn-lt"/>
-                <a:ea typeface="+mn-ea"/>
-                <a:cs typeface="+mn-cs"/>
-              </a:rPr>
-              <a:t>-linked into the test directory.  Here, the branch at the right represents some helper functions that can be imported easily.</a:t>
-            </a:r>
-          </a:p>
-          <a:p>
-            <a:r>
-              <a:rPr lang="en-US" sz="1200" kern="1200" dirty="0">
-                <a:solidFill>
-                  <a:schemeClr val="tx1"/>
-                </a:solidFill>
-                <a:effectLst/>
-                <a:latin typeface="+mn-lt"/>
-                <a:ea typeface="+mn-ea"/>
-                <a:cs typeface="+mn-cs"/>
-              </a:rPr>
-              <a:t>e) That doesn't always work.  The red dot represents a module with lots of dependencies - not needed for this test.  In these cases, the module was modified to remove unnecessary dependencies.</a:t>
-            </a:r>
-          </a:p>
-          <a:p>
-            <a:r>
-              <a:rPr lang="en-US" sz="1200" kern="1200" dirty="0">
-                <a:solidFill>
-                  <a:schemeClr val="tx1"/>
-                </a:solidFill>
-                <a:effectLst/>
-                <a:latin typeface="+mn-lt"/>
-                <a:ea typeface="+mn-ea"/>
-                <a:cs typeface="+mn-cs"/>
-              </a:rPr>
-              <a:t>f) With all the code dependencies sorted out, the test driver itself becomes an isolated unit.  For this example, the original test took hours to run through the batch queue of a cluster.  The new unit test ran in 20 seconds on a developer's laptop.</a:t>
+              <a:t>" code.  The first thing I did was check that the team wanted the feature.  Then I ran their test suite locally.  Everything worked, and then I could build my feature one line at a time – testing everything.  When I finally pushed it to the main repository, I was sure it was something the team onboard with, and that could be easily shown to work well.</a:t>
             </a:r>
           </a:p>
         </p:txBody>
@@ -1889,7 +2299,7 @@
     </p:spTree>
     <p:extLst>
       <p:ext uri="{BB962C8B-B14F-4D97-AF65-F5344CB8AC3E}">
-        <p14:creationId xmlns:p14="http://schemas.microsoft.com/office/powerpoint/2010/main" val="4128517335"/>
+        <p14:creationId xmlns:p14="http://schemas.microsoft.com/office/powerpoint/2010/main" val="1900866051"/>
       </p:ext>
     </p:extLst>
   </p:cSld>
@@ -1943,23 +2353,6 @@
           <a:bodyPr/>
           <a:lstStyle/>
           <a:p>
-            <a:pPr marL="0" marR="0" lvl="0" indent="0" algn="l" defTabSz="914400" rtl="0" eaLnBrk="1" fontAlgn="auto" latinLnBrk="0" hangingPunct="1">
-              <a:lnSpc>
-                <a:spcPct val="100000"/>
-              </a:lnSpc>
-              <a:spcBef>
-                <a:spcPts val="0"/>
-              </a:spcBef>
-              <a:spcAft>
-                <a:spcPts val="0"/>
-              </a:spcAft>
-              <a:buClrTx/>
-              <a:buSzTx/>
-              <a:buFontTx/>
-              <a:buNone/>
-              <a:tabLst/>
-              <a:defRPr/>
-            </a:pPr>
             <a:r>
               <a:rPr lang="en-US" sz="1200" kern="1200" dirty="0">
                 <a:solidFill>
@@ -1970,7 +2363,229 @@
                 <a:ea typeface="+mn-ea"/>
                 <a:cs typeface="+mn-cs"/>
               </a:rPr>
-              <a:t>This third example comes from the FLASH code, which simulates particles and fields in astrophysics, like exploding stars.  Here, the unit-testing framework was developed as a series of layers that build up from basic to advanced functionality.  For example, the cell grid can be tested by creating "fake" functions to put onto the grid, and verifying their behavior.  This mocked dependency means that the test looks directly at the cell grid implementation.  After checking the cell grid works, we are free to use it as a real dependency in subsequent tests of more complicated objects.</a:t>
+              <a:t>Here's an example from the E3SM code, the </a:t>
+            </a:r>
+            <a:r>
+              <a:rPr lang="en-US" sz="1200" kern="1200" dirty="0" err="1">
+                <a:solidFill>
+                  <a:schemeClr val="tx1"/>
+                </a:solidFill>
+                <a:effectLst/>
+                <a:latin typeface="+mn-lt"/>
+                <a:ea typeface="+mn-ea"/>
+                <a:cs typeface="+mn-cs"/>
+              </a:rPr>
+              <a:t>Exascale</a:t>
+            </a:r>
+            <a:r>
+              <a:rPr lang="en-US" sz="1200" kern="1200" dirty="0">
+                <a:solidFill>
+                  <a:schemeClr val="tx1"/>
+                </a:solidFill>
+                <a:effectLst/>
+                <a:latin typeface="+mn-lt"/>
+                <a:ea typeface="+mn-ea"/>
+                <a:cs typeface="+mn-cs"/>
+              </a:rPr>
+              <a:t> Earth System Model.  Although advanced now, it originated in a combination of Fortran codes dealing with various aspects of climate modeling.  The project came together from a collection of independent projects and development practices. They imposed structure on the code through the use of Fortran modules. However, the focus was on running whole models, so their architecture and testing strategies evolved to work with that goal. That led to an unforeseen difficulty. For several sections of the code, even the simplest modification would take running the entire model to test. This meant enqueuing the job in a batch queue that would take non-trivial amount of time to run. What was missing was granular testing. And it wasn’t easy to separate out code sections for testing independently because one Fortran module gets data from another, that in turn gets data from yet another and so on … This is an example of a methodology used to generate an independent test for a code section. </a:t>
+            </a:r>
+          </a:p>
+          <a:p>
+            <a:endParaRPr lang="en-US" sz="1200" kern="1200" dirty="0">
+              <a:solidFill>
+                <a:schemeClr val="tx1"/>
+              </a:solidFill>
+              <a:effectLst/>
+              <a:latin typeface="+mn-lt"/>
+              <a:ea typeface="+mn-ea"/>
+              <a:cs typeface="+mn-cs"/>
+            </a:endParaRPr>
+          </a:p>
+          <a:p>
+            <a:pPr marL="228600" indent="-228600">
+              <a:buAutoNum type="alphaLcParenR"/>
+            </a:pPr>
+            <a:r>
+              <a:rPr lang="en-US" sz="1200" kern="1200" dirty="0">
+                <a:solidFill>
+                  <a:schemeClr val="tx1"/>
+                </a:solidFill>
+                <a:effectLst/>
+                <a:latin typeface="+mn-lt"/>
+                <a:ea typeface="+mn-ea"/>
+                <a:cs typeface="+mn-cs"/>
+              </a:rPr>
+              <a:t>Review the dependencies. Here the model needs to be at a certain ”state” to invoke the target code.</a:t>
+            </a:r>
+          </a:p>
+          <a:p>
+            <a:pPr marL="228600" indent="-228600">
+              <a:buAutoNum type="alphaLcParenR"/>
+            </a:pPr>
+            <a:r>
+              <a:rPr lang="en-US" sz="1200" kern="1200" dirty="0">
+                <a:solidFill>
+                  <a:schemeClr val="tx1"/>
+                </a:solidFill>
+                <a:effectLst/>
+                <a:latin typeface="+mn-lt"/>
+                <a:ea typeface="+mn-ea"/>
+                <a:cs typeface="+mn-cs"/>
+              </a:rPr>
+              <a:t>Look for dependencies on Fortran data modules that are outside the sub-tree containing the source code for this section</a:t>
+            </a:r>
+          </a:p>
+          <a:p>
+            <a:pPr marL="228600" indent="-228600">
+              <a:buAutoNum type="alphaLcParenR"/>
+            </a:pPr>
+            <a:r>
+              <a:rPr lang="en-US" sz="1200" kern="1200" dirty="0">
+                <a:solidFill>
+                  <a:schemeClr val="tx1"/>
+                </a:solidFill>
+                <a:effectLst/>
+                <a:latin typeface="+mn-lt"/>
+                <a:ea typeface="+mn-ea"/>
+                <a:cs typeface="+mn-cs"/>
+              </a:rPr>
+              <a:t>For each of the data modules determine where the dependencies can be pruned. </a:t>
+            </a:r>
+          </a:p>
+          <a:p>
+            <a:r>
+              <a:rPr lang="en-US" sz="1200" kern="1200" dirty="0">
+                <a:solidFill>
+                  <a:schemeClr val="tx1"/>
+                </a:solidFill>
+                <a:effectLst/>
+                <a:latin typeface="+mn-lt"/>
+                <a:ea typeface="+mn-ea"/>
+                <a:cs typeface="+mn-cs"/>
+              </a:rPr>
+              <a:t>d) Run the full model and capture the “state” just before the invocation of the target section.</a:t>
+            </a:r>
+          </a:p>
+          <a:p>
+            <a:r>
+              <a:rPr lang="en-US" sz="1200" kern="1200" dirty="0">
+                <a:solidFill>
+                  <a:schemeClr val="tx1"/>
+                </a:solidFill>
+                <a:effectLst/>
+                <a:latin typeface="+mn-lt"/>
+                <a:ea typeface="+mn-ea"/>
+                <a:cs typeface="+mn-cs"/>
+              </a:rPr>
+              <a:t>e) Create a separate working directory for the test</a:t>
+            </a:r>
+          </a:p>
+          <a:p>
+            <a:r>
+              <a:rPr lang="en-US" sz="1200" kern="1200" dirty="0">
+                <a:solidFill>
+                  <a:schemeClr val="tx1"/>
+                </a:solidFill>
+                <a:effectLst/>
+                <a:latin typeface="+mn-lt"/>
+                <a:ea typeface="+mn-ea"/>
+                <a:cs typeface="+mn-cs"/>
+              </a:rPr>
+              <a:t>f) In this working area create soft links to the files that have dependencies</a:t>
+            </a:r>
+          </a:p>
+          <a:p>
+            <a:r>
+              <a:rPr lang="en-US" sz="1200" kern="1200" dirty="0">
+                <a:solidFill>
+                  <a:schemeClr val="tx1"/>
+                </a:solidFill>
+                <a:effectLst/>
+                <a:latin typeface="+mn-lt"/>
+                <a:ea typeface="+mn-ea"/>
+                <a:cs typeface="+mn-cs"/>
+              </a:rPr>
+              <a:t>g) Where the dependence is to be pruned create a copy of the corresponding file in the working area and modify it as needed.</a:t>
+            </a:r>
+          </a:p>
+          <a:p>
+            <a:r>
+              <a:rPr lang="en-US" sz="1200" kern="1200" dirty="0">
+                <a:solidFill>
+                  <a:schemeClr val="tx1"/>
+                </a:solidFill>
+                <a:effectLst/>
+                <a:latin typeface="+mn-lt"/>
+                <a:ea typeface="+mn-ea"/>
+                <a:cs typeface="+mn-cs"/>
+              </a:rPr>
+              <a:t>e) Create a test driver to load the state and exercise the unit.</a:t>
+            </a:r>
+          </a:p>
+          <a:p>
+            <a:r>
+              <a:rPr lang="en-US" sz="1200" kern="1200" dirty="0">
+                <a:solidFill>
+                  <a:schemeClr val="tx1"/>
+                </a:solidFill>
+                <a:effectLst/>
+                <a:latin typeface="+mn-lt"/>
+                <a:ea typeface="+mn-ea"/>
+                <a:cs typeface="+mn-cs"/>
+              </a:rPr>
+              <a:t>d) If extra functions from the code were accessed, these were </a:t>
+            </a:r>
+            <a:r>
+              <a:rPr lang="en-US" sz="1200" kern="1200" dirty="0" err="1">
+                <a:solidFill>
+                  <a:schemeClr val="tx1"/>
+                </a:solidFill>
+                <a:effectLst/>
+                <a:latin typeface="+mn-lt"/>
+                <a:ea typeface="+mn-ea"/>
+                <a:cs typeface="+mn-cs"/>
+              </a:rPr>
+              <a:t>sym</a:t>
+            </a:r>
+            <a:r>
+              <a:rPr lang="en-US" sz="1200" kern="1200" dirty="0">
+                <a:solidFill>
+                  <a:schemeClr val="tx1"/>
+                </a:solidFill>
+                <a:effectLst/>
+                <a:latin typeface="+mn-lt"/>
+                <a:ea typeface="+mn-ea"/>
+                <a:cs typeface="+mn-cs"/>
+              </a:rPr>
+              <a:t>-linked into the test directory.  Here, the branch at the right represents some helper functions that can be imported easily.</a:t>
+            </a:r>
+          </a:p>
+          <a:p>
+            <a:r>
+              <a:rPr lang="en-US" sz="1200" kern="1200" dirty="0">
+                <a:solidFill>
+                  <a:schemeClr val="tx1"/>
+                </a:solidFill>
+                <a:effectLst/>
+                <a:latin typeface="+mn-lt"/>
+                <a:ea typeface="+mn-ea"/>
+                <a:cs typeface="+mn-cs"/>
+              </a:rPr>
+              <a:t>e) That doesn't always work.  The red dot represents a module with lots of dependencies - not needed for this test.  In these cases, the module was modified to remove unnecessary dependencies.</a:t>
+            </a:r>
+          </a:p>
+          <a:p>
+            <a:r>
+              <a:rPr lang="en-US" sz="1200" kern="1200" dirty="0">
+                <a:solidFill>
+                  <a:schemeClr val="tx1"/>
+                </a:solidFill>
+                <a:effectLst/>
+                <a:latin typeface="+mn-lt"/>
+                <a:ea typeface="+mn-ea"/>
+                <a:cs typeface="+mn-cs"/>
+              </a:rPr>
+              <a:t>f) With all the code dependencies sorted out, the test driver itself becomes an isolated unit.  For this example, the original test took hours to run through the batch queue of a cluster.  The new unit test ran in 20 seconds on a developer's laptop.</a:t>
             </a:r>
           </a:p>
         </p:txBody>
@@ -2001,7 +2616,7 @@
     </p:spTree>
     <p:extLst>
       <p:ext uri="{BB962C8B-B14F-4D97-AF65-F5344CB8AC3E}">
-        <p14:creationId xmlns:p14="http://schemas.microsoft.com/office/powerpoint/2010/main" val="2943802418"/>
+        <p14:creationId xmlns:p14="http://schemas.microsoft.com/office/powerpoint/2010/main" val="4128517335"/>
       </p:ext>
     </p:extLst>
   </p:cSld>
@@ -2082,7 +2697,7 @@
                 <a:ea typeface="+mn-ea"/>
                 <a:cs typeface="+mn-cs"/>
               </a:rPr>
-              <a:t>Here's another example of verifying the halo exchange on a cell grid.  The test initializes interior cells with a known function, does the halo exchange, and checks whether the guard cell has been properly copied over.  Similarly, a unit test can be written to verify parts of the computations - like computing energy from pressure and temperature.</a:t>
+              <a:t>This third example comes from the FLASH code, which simulates particles and fields in astrophysics, like exploding stars.  Here, the unit-testing framework was developed as a series of layers that build up from basic to advanced functionality.  For example, the cell grid can be tested by creating "fake" functions to put onto the grid, and verifying their behavior.  This mocked dependency means that the test looks directly at the cell grid implementation.  After checking the cell grid works, we are free to use it as a real dependency in subsequent tests of more complicated objects.</a:t>
             </a:r>
           </a:p>
         </p:txBody>
@@ -2113,7 +2728,7 @@
     </p:spTree>
     <p:extLst>
       <p:ext uri="{BB962C8B-B14F-4D97-AF65-F5344CB8AC3E}">
-        <p14:creationId xmlns:p14="http://schemas.microsoft.com/office/powerpoint/2010/main" val="2514086208"/>
+        <p14:creationId xmlns:p14="http://schemas.microsoft.com/office/powerpoint/2010/main" val="2943802418"/>
       </p:ext>
     </p:extLst>
   </p:cSld>
@@ -2194,55 +2809,7 @@
                 <a:ea typeface="+mn-ea"/>
                 <a:cs typeface="+mn-cs"/>
               </a:rPr>
-              <a:t>Once those basic unit tests are done, we can create a unit test at the next level.  Here, the </a:t>
-            </a:r>
-            <a:r>
-              <a:rPr lang="en-US" sz="1200" kern="1200" dirty="0" err="1">
-                <a:solidFill>
-                  <a:schemeClr val="tx1"/>
-                </a:solidFill>
-                <a:effectLst/>
-                <a:latin typeface="+mn-lt"/>
-                <a:ea typeface="+mn-ea"/>
-                <a:cs typeface="+mn-cs"/>
-              </a:rPr>
-              <a:t>Sedov</a:t>
-            </a:r>
-            <a:r>
-              <a:rPr lang="en-US" sz="1200" kern="1200" dirty="0">
-                <a:solidFill>
-                  <a:schemeClr val="tx1"/>
-                </a:solidFill>
-                <a:effectLst/>
-                <a:latin typeface="+mn-lt"/>
-                <a:ea typeface="+mn-ea"/>
-                <a:cs typeface="+mn-cs"/>
-              </a:rPr>
-              <a:t> blast wave is simulated using the cell grid and equation of state previously tested.  The </a:t>
-            </a:r>
-            <a:r>
-              <a:rPr lang="en-US" sz="1200" kern="1200" dirty="0" err="1">
-                <a:solidFill>
-                  <a:schemeClr val="tx1"/>
-                </a:solidFill>
-                <a:effectLst/>
-                <a:latin typeface="+mn-lt"/>
-                <a:ea typeface="+mn-ea"/>
-                <a:cs typeface="+mn-cs"/>
-              </a:rPr>
-              <a:t>Sedov</a:t>
-            </a:r>
-            <a:r>
-              <a:rPr lang="en-US" sz="1200" kern="1200" dirty="0">
-                <a:solidFill>
-                  <a:schemeClr val="tx1"/>
-                </a:solidFill>
-                <a:effectLst/>
-                <a:latin typeface="+mn-lt"/>
-                <a:ea typeface="+mn-ea"/>
-                <a:cs typeface="+mn-cs"/>
-              </a:rPr>
-              <a:t> wave has a known analytical solution, which provides an error estimate for the implementation.  Out-of-tolerance errors at this stage indicate a problem specific to hydrodynamics, since the cells and equation of state are already tested.  In addition, plotting errors vs. space and time helps to train graduate students.</a:t>
+              <a:t>Here's another example of verifying the halo exchange on a cell grid.  The test initializes interior cells with a known function, does the halo exchange, and checks whether the guard cell has been properly copied over.  Similarly, a unit test can be written to verify parts of the computations - like computing energy from pressure and temperature.</a:t>
             </a:r>
           </a:p>
         </p:txBody>
@@ -2273,7 +2840,7 @@
     </p:spTree>
     <p:extLst>
       <p:ext uri="{BB962C8B-B14F-4D97-AF65-F5344CB8AC3E}">
-        <p14:creationId xmlns:p14="http://schemas.microsoft.com/office/powerpoint/2010/main" val="1935325995"/>
+        <p14:creationId xmlns:p14="http://schemas.microsoft.com/office/powerpoint/2010/main" val="2531848196"/>
       </p:ext>
     </p:extLst>
   </p:cSld>
@@ -5830,6 +6397,1098 @@
       </p:grpSpPr>
       <p:sp>
         <p:nvSpPr>
+          <p:cNvPr id="2" name="Title 1"/>
+          <p:cNvSpPr>
+            <a:spLocks noGrp="1"/>
+          </p:cNvSpPr>
+          <p:nvPr>
+            <p:ph type="title"/>
+          </p:nvPr>
+        </p:nvSpPr>
+        <p:spPr/>
+        <p:txBody>
+          <a:bodyPr/>
+          <a:lstStyle/>
+          <a:p>
+            <a:r>
+              <a:rPr lang="en-US" dirty="0"/>
+              <a:t>Example 3: Structured Testing</a:t>
+            </a:r>
+          </a:p>
+        </p:txBody>
+      </p:sp>
+      <p:sp>
+        <p:nvSpPr>
+          <p:cNvPr id="5" name="Content Placeholder 4"/>
+          <p:cNvSpPr>
+            <a:spLocks noGrp="1"/>
+          </p:cNvSpPr>
+          <p:nvPr>
+            <p:ph sz="quarter" idx="1"/>
+          </p:nvPr>
+        </p:nvSpPr>
+        <p:spPr>
+          <a:xfrm>
+            <a:off x="496346" y="943897"/>
+            <a:ext cx="4761454" cy="4893023"/>
+          </a:xfrm>
+        </p:spPr>
+        <p:txBody>
+          <a:bodyPr/>
+          <a:lstStyle/>
+          <a:p>
+            <a:pPr marL="0" indent="0">
+              <a:buNone/>
+            </a:pPr>
+            <a:r>
+              <a:rPr lang="en-US" b="1" dirty="0"/>
+              <a:t>Unit test for Grid halo cell fill</a:t>
+            </a:r>
+          </a:p>
+          <a:p>
+            <a:r>
+              <a:rPr lang="en-US" dirty="0"/>
+              <a:t>Verification of guard/ghost/halo  cell fill</a:t>
+            </a:r>
+          </a:p>
+          <a:p>
+            <a:r>
+              <a:rPr lang="en-US" dirty="0"/>
+              <a:t>Initialize field on interior cells (red)</a:t>
+            </a:r>
+          </a:p>
+          <a:p>
+            <a:r>
+              <a:rPr lang="en-US" dirty="0"/>
+              <a:t>Apply guard cell fill</a:t>
+            </a:r>
+          </a:p>
+          <a:p>
+            <a:r>
+              <a:rPr lang="en-US" dirty="0"/>
+              <a:t>Check for equivalence with known fill pattern</a:t>
+            </a:r>
+          </a:p>
+        </p:txBody>
+      </p:sp>
+      <p:sp>
+        <p:nvSpPr>
+          <p:cNvPr id="6" name="Donut 5">
+            <a:extLst>
+              <a:ext uri="{FF2B5EF4-FFF2-40B4-BE49-F238E27FC236}">
+                <a16:creationId xmlns:a16="http://schemas.microsoft.com/office/drawing/2014/main" id="{AF11DFE6-1CA6-7B47-BB91-0A4FD7EE6189}"/>
+              </a:ext>
+            </a:extLst>
+          </p:cNvPr>
+          <p:cNvSpPr/>
+          <p:nvPr/>
+        </p:nvSpPr>
+        <p:spPr>
+          <a:xfrm>
+            <a:off x="164373" y="4461000"/>
+            <a:ext cx="1847200" cy="1758821"/>
+          </a:xfrm>
+          <a:prstGeom prst="donut">
+            <a:avLst/>
+          </a:prstGeom>
+          <a:solidFill>
+            <a:schemeClr val="accent6">
+              <a:lumMod val="40000"/>
+              <a:lumOff val="60000"/>
+            </a:schemeClr>
+          </a:solidFill>
+          <a:ln>
+            <a:solidFill>
+              <a:schemeClr val="tx1"/>
+            </a:solidFill>
+          </a:ln>
+        </p:spPr>
+        <p:style>
+          <a:lnRef idx="1">
+            <a:schemeClr val="accent1"/>
+          </a:lnRef>
+          <a:fillRef idx="3">
+            <a:schemeClr val="accent1"/>
+          </a:fillRef>
+          <a:effectRef idx="2">
+            <a:schemeClr val="accent1"/>
+          </a:effectRef>
+          <a:fontRef idx="minor">
+            <a:schemeClr val="lt1"/>
+          </a:fontRef>
+        </p:style>
+        <p:txBody>
+          <a:bodyPr rtlCol="0" anchor="ctr"/>
+          <a:lstStyle/>
+          <a:p>
+            <a:pPr algn="ctr"/>
+            <a:r>
+              <a:rPr lang="en-US" dirty="0" err="1">
+                <a:solidFill>
+                  <a:schemeClr val="tx1"/>
+                </a:solidFill>
+              </a:rPr>
+              <a:t>gc</a:t>
+            </a:r>
+            <a:r>
+              <a:rPr lang="en-US" dirty="0">
+                <a:solidFill>
+                  <a:schemeClr val="tx1"/>
+                </a:solidFill>
+              </a:rPr>
+              <a:t> test</a:t>
+            </a:r>
+          </a:p>
+        </p:txBody>
+      </p:sp>
+      <p:grpSp>
+        <p:nvGrpSpPr>
+          <p:cNvPr id="9" name="Group 8">
+            <a:extLst>
+              <a:ext uri="{FF2B5EF4-FFF2-40B4-BE49-F238E27FC236}">
+                <a16:creationId xmlns:a16="http://schemas.microsoft.com/office/drawing/2014/main" id="{85793508-B53B-654E-95B1-E2E34F1DE3B4}"/>
+              </a:ext>
+            </a:extLst>
+          </p:cNvPr>
+          <p:cNvGrpSpPr/>
+          <p:nvPr/>
+        </p:nvGrpSpPr>
+        <p:grpSpPr>
+          <a:xfrm>
+            <a:off x="6505642" y="2237359"/>
+            <a:ext cx="2079986" cy="1631092"/>
+            <a:chOff x="9658247" y="3805881"/>
+            <a:chExt cx="2079986" cy="1631092"/>
+          </a:xfrm>
+        </p:grpSpPr>
+        <p:sp>
+          <p:nvSpPr>
+            <p:cNvPr id="10" name="Rectangle 9">
+              <a:extLst>
+                <a:ext uri="{FF2B5EF4-FFF2-40B4-BE49-F238E27FC236}">
+                  <a16:creationId xmlns:a16="http://schemas.microsoft.com/office/drawing/2014/main" id="{F1BC5DAF-FB6C-E846-8754-C13ADB909601}"/>
+                </a:ext>
+              </a:extLst>
+            </p:cNvPr>
+            <p:cNvSpPr/>
+            <p:nvPr/>
+          </p:nvSpPr>
+          <p:spPr>
+            <a:xfrm>
+              <a:off x="9658247" y="3805881"/>
+              <a:ext cx="2079986" cy="1631092"/>
+            </a:xfrm>
+            <a:prstGeom prst="rect">
+              <a:avLst/>
+            </a:prstGeom>
+            <a:solidFill>
+              <a:schemeClr val="accent3">
+                <a:alpha val="58000"/>
+              </a:schemeClr>
+            </a:solidFill>
+            <a:ln>
+              <a:noFill/>
+            </a:ln>
+            <a:effectLst>
+              <a:outerShdw blurRad="44450" dist="27940" dir="5400000" algn="ctr">
+                <a:srgbClr val="000000">
+                  <a:alpha val="32000"/>
+                </a:srgbClr>
+              </a:outerShdw>
+            </a:effectLst>
+          </p:spPr>
+          <p:txBody>
+            <a:bodyPr rot="0" spcFirstLastPara="0" vertOverflow="overflow" horzOverflow="overflow" vert="horz" wrap="square" lIns="121851" tIns="60925" rIns="121851" bIns="60925" numCol="1" spcCol="0" rtlCol="0" fromWordArt="0" anchor="ctr" anchorCtr="0" forceAA="0" compatLnSpc="1">
+              <a:prstTxWarp prst="textNoShape">
+                <a:avLst/>
+              </a:prstTxWarp>
+              <a:noAutofit/>
+            </a:bodyPr>
+            <a:lstStyle/>
+            <a:p>
+              <a:pPr algn="ctr">
+                <a:lnSpc>
+                  <a:spcPct val="90000"/>
+                </a:lnSpc>
+              </a:pPr>
+              <a:endParaRPr lang="en-US" sz="2000" dirty="0">
+                <a:solidFill>
+                  <a:schemeClr val="bg1"/>
+                </a:solidFill>
+              </a:endParaRPr>
+            </a:p>
+          </p:txBody>
+        </p:sp>
+        <p:sp>
+          <p:nvSpPr>
+            <p:cNvPr id="11" name="Rectangle 10">
+              <a:extLst>
+                <a:ext uri="{FF2B5EF4-FFF2-40B4-BE49-F238E27FC236}">
+                  <a16:creationId xmlns:a16="http://schemas.microsoft.com/office/drawing/2014/main" id="{674E4AB0-5EBC-A14F-93BE-2A60B4418EA4}"/>
+                </a:ext>
+              </a:extLst>
+            </p:cNvPr>
+            <p:cNvSpPr/>
+            <p:nvPr/>
+          </p:nvSpPr>
+          <p:spPr>
+            <a:xfrm>
+              <a:off x="10056889" y="4079744"/>
+              <a:ext cx="1285103" cy="1083365"/>
+            </a:xfrm>
+            <a:prstGeom prst="rect">
+              <a:avLst/>
+            </a:prstGeom>
+            <a:solidFill>
+              <a:srgbClr val="FF0000"/>
+            </a:solidFill>
+            <a:ln>
+              <a:noFill/>
+            </a:ln>
+            <a:effectLst>
+              <a:outerShdw blurRad="44450" dist="27940" dir="5400000" algn="ctr">
+                <a:srgbClr val="000000">
+                  <a:alpha val="32000"/>
+                </a:srgbClr>
+              </a:outerShdw>
+            </a:effectLst>
+          </p:spPr>
+          <p:txBody>
+            <a:bodyPr rot="0" spcFirstLastPara="0" vertOverflow="overflow" horzOverflow="overflow" vert="horz" wrap="square" lIns="121851" tIns="60925" rIns="121851" bIns="60925" numCol="1" spcCol="0" rtlCol="0" fromWordArt="0" anchor="ctr" anchorCtr="0" forceAA="0" compatLnSpc="1">
+              <a:prstTxWarp prst="textNoShape">
+                <a:avLst/>
+              </a:prstTxWarp>
+              <a:noAutofit/>
+            </a:bodyPr>
+            <a:lstStyle/>
+            <a:p>
+              <a:pPr algn="ctr">
+                <a:lnSpc>
+                  <a:spcPct val="90000"/>
+                </a:lnSpc>
+              </a:pPr>
+              <a:r>
+                <a:rPr lang="en-US" sz="2000" dirty="0">
+                  <a:solidFill>
+                    <a:schemeClr val="bg1"/>
+                  </a:solidFill>
+                </a:rPr>
+                <a:t>rank 3</a:t>
+              </a:r>
+            </a:p>
+          </p:txBody>
+        </p:sp>
+      </p:grpSp>
+      <p:grpSp>
+        <p:nvGrpSpPr>
+          <p:cNvPr id="12" name="Group 11">
+            <a:extLst>
+              <a:ext uri="{FF2B5EF4-FFF2-40B4-BE49-F238E27FC236}">
+                <a16:creationId xmlns:a16="http://schemas.microsoft.com/office/drawing/2014/main" id="{2348CE2A-6110-8E44-A7B1-762FE7CAAC53}"/>
+              </a:ext>
+            </a:extLst>
+          </p:cNvPr>
+          <p:cNvGrpSpPr/>
+          <p:nvPr/>
+        </p:nvGrpSpPr>
+        <p:grpSpPr>
+          <a:xfrm>
+            <a:off x="7789106" y="1180370"/>
+            <a:ext cx="2079986" cy="1631092"/>
+            <a:chOff x="9658247" y="3805881"/>
+            <a:chExt cx="2079986" cy="1631092"/>
+          </a:xfrm>
+        </p:grpSpPr>
+        <p:sp>
+          <p:nvSpPr>
+            <p:cNvPr id="13" name="Rectangle 12">
+              <a:extLst>
+                <a:ext uri="{FF2B5EF4-FFF2-40B4-BE49-F238E27FC236}">
+                  <a16:creationId xmlns:a16="http://schemas.microsoft.com/office/drawing/2014/main" id="{18E08F0C-3C42-FE43-817A-850D8252FDA8}"/>
+                </a:ext>
+              </a:extLst>
+            </p:cNvPr>
+            <p:cNvSpPr/>
+            <p:nvPr/>
+          </p:nvSpPr>
+          <p:spPr>
+            <a:xfrm>
+              <a:off x="9658247" y="3805881"/>
+              <a:ext cx="2079986" cy="1631092"/>
+            </a:xfrm>
+            <a:prstGeom prst="rect">
+              <a:avLst/>
+            </a:prstGeom>
+            <a:solidFill>
+              <a:schemeClr val="accent3">
+                <a:alpha val="58000"/>
+              </a:schemeClr>
+            </a:solidFill>
+            <a:ln>
+              <a:noFill/>
+            </a:ln>
+            <a:effectLst>
+              <a:outerShdw blurRad="44450" dist="27940" dir="5400000" algn="ctr">
+                <a:srgbClr val="000000">
+                  <a:alpha val="32000"/>
+                </a:srgbClr>
+              </a:outerShdw>
+            </a:effectLst>
+          </p:spPr>
+          <p:txBody>
+            <a:bodyPr rot="0" spcFirstLastPara="0" vertOverflow="overflow" horzOverflow="overflow" vert="horz" wrap="square" lIns="121851" tIns="60925" rIns="121851" bIns="60925" numCol="1" spcCol="0" rtlCol="0" fromWordArt="0" anchor="ctr" anchorCtr="0" forceAA="0" compatLnSpc="1">
+              <a:prstTxWarp prst="textNoShape">
+                <a:avLst/>
+              </a:prstTxWarp>
+              <a:noAutofit/>
+            </a:bodyPr>
+            <a:lstStyle/>
+            <a:p>
+              <a:pPr algn="ctr">
+                <a:lnSpc>
+                  <a:spcPct val="90000"/>
+                </a:lnSpc>
+              </a:pPr>
+              <a:endParaRPr lang="en-US" sz="2000" dirty="0">
+                <a:solidFill>
+                  <a:schemeClr val="bg1"/>
+                </a:solidFill>
+              </a:endParaRPr>
+            </a:p>
+          </p:txBody>
+        </p:sp>
+        <p:sp>
+          <p:nvSpPr>
+            <p:cNvPr id="14" name="Rectangle 13">
+              <a:extLst>
+                <a:ext uri="{FF2B5EF4-FFF2-40B4-BE49-F238E27FC236}">
+                  <a16:creationId xmlns:a16="http://schemas.microsoft.com/office/drawing/2014/main" id="{8E56C841-8950-C544-BBEF-292FA2BFD703}"/>
+                </a:ext>
+              </a:extLst>
+            </p:cNvPr>
+            <p:cNvSpPr/>
+            <p:nvPr/>
+          </p:nvSpPr>
+          <p:spPr>
+            <a:xfrm>
+              <a:off x="10056889" y="4079744"/>
+              <a:ext cx="1285103" cy="1083365"/>
+            </a:xfrm>
+            <a:prstGeom prst="rect">
+              <a:avLst/>
+            </a:prstGeom>
+            <a:solidFill>
+              <a:srgbClr val="FF0000"/>
+            </a:solidFill>
+            <a:ln>
+              <a:noFill/>
+            </a:ln>
+            <a:effectLst>
+              <a:outerShdw blurRad="44450" dist="27940" dir="5400000" algn="ctr">
+                <a:srgbClr val="000000">
+                  <a:alpha val="32000"/>
+                </a:srgbClr>
+              </a:outerShdw>
+            </a:effectLst>
+          </p:spPr>
+          <p:txBody>
+            <a:bodyPr rot="0" spcFirstLastPara="0" vertOverflow="overflow" horzOverflow="overflow" vert="horz" wrap="square" lIns="121851" tIns="60925" rIns="121851" bIns="60925" numCol="1" spcCol="0" rtlCol="0" fromWordArt="0" anchor="ctr" anchorCtr="0" forceAA="0" compatLnSpc="1">
+              <a:prstTxWarp prst="textNoShape">
+                <a:avLst/>
+              </a:prstTxWarp>
+              <a:noAutofit/>
+            </a:bodyPr>
+            <a:lstStyle/>
+            <a:p>
+              <a:pPr algn="ctr">
+                <a:lnSpc>
+                  <a:spcPct val="90000"/>
+                </a:lnSpc>
+              </a:pPr>
+              <a:r>
+                <a:rPr lang="en-US" sz="2000" dirty="0">
+                  <a:solidFill>
+                    <a:schemeClr val="bg1"/>
+                  </a:solidFill>
+                </a:rPr>
+                <a:t>rank 2</a:t>
+              </a:r>
+            </a:p>
+          </p:txBody>
+        </p:sp>
+      </p:grpSp>
+      <p:sp>
+        <p:nvSpPr>
+          <p:cNvPr id="15" name="TextBox 14">
+            <a:extLst>
+              <a:ext uri="{FF2B5EF4-FFF2-40B4-BE49-F238E27FC236}">
+                <a16:creationId xmlns:a16="http://schemas.microsoft.com/office/drawing/2014/main" id="{A8555D94-28CA-8244-A3F4-18ED0B844E35}"/>
+              </a:ext>
+            </a:extLst>
+          </p:cNvPr>
+          <p:cNvSpPr txBox="1"/>
+          <p:nvPr/>
+        </p:nvSpPr>
+        <p:spPr>
+          <a:xfrm>
+            <a:off x="8626426" y="2902167"/>
+            <a:ext cx="1201867" cy="433965"/>
+          </a:xfrm>
+          <a:prstGeom prst="rect">
+            <a:avLst/>
+          </a:prstGeom>
+          <a:noFill/>
+        </p:spPr>
+        <p:txBody>
+          <a:bodyPr wrap="none" lIns="118872" tIns="91440" rIns="118872" bIns="91440" rtlCol="0" anchor="ctr" anchorCtr="0">
+            <a:spAutoFit/>
+          </a:bodyPr>
+          <a:lstStyle/>
+          <a:p>
+            <a:pPr algn="l">
+              <a:lnSpc>
+                <a:spcPct val="90000"/>
+              </a:lnSpc>
+            </a:pPr>
+            <a:r>
+              <a:rPr lang="en-US" dirty="0"/>
+              <a:t>halo cells</a:t>
+            </a:r>
+          </a:p>
+        </p:txBody>
+      </p:sp>
+    </p:spTree>
+    <p:custDataLst>
+      <p:tags r:id="rId1"/>
+    </p:custDataLst>
+    <p:extLst>
+      <p:ext uri="{BB962C8B-B14F-4D97-AF65-F5344CB8AC3E}">
+        <p14:creationId xmlns:p14="http://schemas.microsoft.com/office/powerpoint/2010/main" val="3582748909"/>
+      </p:ext>
+    </p:extLst>
+  </p:cSld>
+  <p:clrMapOvr>
+    <a:masterClrMapping/>
+  </p:clrMapOvr>
+</p:sld>
+</file>
+
+<file path=ppt/slides/slide11.xml><?xml version="1.0" encoding="utf-8"?>
+<p:sld xmlns:a="http://schemas.openxmlformats.org/drawingml/2006/main" xmlns:r="http://schemas.openxmlformats.org/officeDocument/2006/relationships" xmlns:p="http://schemas.openxmlformats.org/presentationml/2006/main">
+  <p:cSld>
+    <p:spTree>
+      <p:nvGrpSpPr>
+        <p:cNvPr id="1" name=""/>
+        <p:cNvGrpSpPr/>
+        <p:nvPr/>
+      </p:nvGrpSpPr>
+      <p:grpSpPr>
+        <a:xfrm>
+          <a:off x="0" y="0"/>
+          <a:ext cx="0" cy="0"/>
+          <a:chOff x="0" y="0"/>
+          <a:chExt cx="0" cy="0"/>
+        </a:xfrm>
+      </p:grpSpPr>
+      <p:sp>
+        <p:nvSpPr>
+          <p:cNvPr id="2" name="Title 1"/>
+          <p:cNvSpPr>
+            <a:spLocks noGrp="1"/>
+          </p:cNvSpPr>
+          <p:nvPr>
+            <p:ph type="title"/>
+          </p:nvPr>
+        </p:nvSpPr>
+        <p:spPr/>
+        <p:txBody>
+          <a:bodyPr/>
+          <a:lstStyle/>
+          <a:p>
+            <a:r>
+              <a:rPr lang="en-US" dirty="0"/>
+              <a:t>Example 3: Structured Testing</a:t>
+            </a:r>
+          </a:p>
+        </p:txBody>
+      </p:sp>
+      <p:sp>
+        <p:nvSpPr>
+          <p:cNvPr id="5" name="Content Placeholder 4"/>
+          <p:cNvSpPr>
+            <a:spLocks noGrp="1"/>
+          </p:cNvSpPr>
+          <p:nvPr>
+            <p:ph sz="quarter" idx="1"/>
+          </p:nvPr>
+        </p:nvSpPr>
+        <p:spPr>
+          <a:xfrm>
+            <a:off x="496346" y="943897"/>
+            <a:ext cx="4761454" cy="4893023"/>
+          </a:xfrm>
+        </p:spPr>
+        <p:txBody>
+          <a:bodyPr/>
+          <a:lstStyle/>
+          <a:p>
+            <a:pPr marL="0" indent="0">
+              <a:buNone/>
+            </a:pPr>
+            <a:r>
+              <a:rPr lang="en-US" b="1" dirty="0"/>
+              <a:t>Unit test for Grid halo cell fill</a:t>
+            </a:r>
+          </a:p>
+          <a:p>
+            <a:r>
+              <a:rPr lang="en-US" dirty="0"/>
+              <a:t>Verification of guard/ghost/halo  cell fill</a:t>
+            </a:r>
+          </a:p>
+          <a:p>
+            <a:r>
+              <a:rPr lang="en-US" dirty="0"/>
+              <a:t>Initialize field on interior cells (red)</a:t>
+            </a:r>
+          </a:p>
+          <a:p>
+            <a:r>
+              <a:rPr lang="en-US" dirty="0"/>
+              <a:t>Apply guard cell fill</a:t>
+            </a:r>
+          </a:p>
+          <a:p>
+            <a:r>
+              <a:rPr lang="en-US" dirty="0"/>
+              <a:t>Check for equivalence with known fill pattern</a:t>
+            </a:r>
+          </a:p>
+        </p:txBody>
+      </p:sp>
+      <p:sp>
+        <p:nvSpPr>
+          <p:cNvPr id="6" name="Donut 5">
+            <a:extLst>
+              <a:ext uri="{FF2B5EF4-FFF2-40B4-BE49-F238E27FC236}">
+                <a16:creationId xmlns:a16="http://schemas.microsoft.com/office/drawing/2014/main" id="{AF11DFE6-1CA6-7B47-BB91-0A4FD7EE6189}"/>
+              </a:ext>
+            </a:extLst>
+          </p:cNvPr>
+          <p:cNvSpPr/>
+          <p:nvPr/>
+        </p:nvSpPr>
+        <p:spPr>
+          <a:xfrm>
+            <a:off x="164373" y="4461000"/>
+            <a:ext cx="1847200" cy="1758821"/>
+          </a:xfrm>
+          <a:prstGeom prst="donut">
+            <a:avLst/>
+          </a:prstGeom>
+          <a:solidFill>
+            <a:schemeClr val="accent6">
+              <a:lumMod val="40000"/>
+              <a:lumOff val="60000"/>
+            </a:schemeClr>
+          </a:solidFill>
+          <a:ln>
+            <a:solidFill>
+              <a:schemeClr val="tx1"/>
+            </a:solidFill>
+          </a:ln>
+        </p:spPr>
+        <p:style>
+          <a:lnRef idx="1">
+            <a:schemeClr val="accent1"/>
+          </a:lnRef>
+          <a:fillRef idx="3">
+            <a:schemeClr val="accent1"/>
+          </a:fillRef>
+          <a:effectRef idx="2">
+            <a:schemeClr val="accent1"/>
+          </a:effectRef>
+          <a:fontRef idx="minor">
+            <a:schemeClr val="lt1"/>
+          </a:fontRef>
+        </p:style>
+        <p:txBody>
+          <a:bodyPr rtlCol="0" anchor="ctr"/>
+          <a:lstStyle/>
+          <a:p>
+            <a:pPr algn="ctr"/>
+            <a:r>
+              <a:rPr lang="en-US" dirty="0" err="1">
+                <a:solidFill>
+                  <a:schemeClr val="tx1"/>
+                </a:solidFill>
+              </a:rPr>
+              <a:t>gc</a:t>
+            </a:r>
+            <a:r>
+              <a:rPr lang="en-US" dirty="0">
+                <a:solidFill>
+                  <a:schemeClr val="tx1"/>
+                </a:solidFill>
+              </a:rPr>
+              <a:t> test</a:t>
+            </a:r>
+          </a:p>
+        </p:txBody>
+      </p:sp>
+      <p:sp>
+        <p:nvSpPr>
+          <p:cNvPr id="8" name="Donut 7">
+            <a:extLst>
+              <a:ext uri="{FF2B5EF4-FFF2-40B4-BE49-F238E27FC236}">
+                <a16:creationId xmlns:a16="http://schemas.microsoft.com/office/drawing/2014/main" id="{C8782544-B531-1D40-A502-BF7E9615BCB6}"/>
+              </a:ext>
+            </a:extLst>
+          </p:cNvPr>
+          <p:cNvSpPr/>
+          <p:nvPr/>
+        </p:nvSpPr>
+        <p:spPr>
+          <a:xfrm>
+            <a:off x="2578899" y="4460999"/>
+            <a:ext cx="1847200" cy="1758821"/>
+          </a:xfrm>
+          <a:prstGeom prst="donut">
+            <a:avLst/>
+          </a:prstGeom>
+          <a:solidFill>
+            <a:schemeClr val="accent6">
+              <a:lumMod val="40000"/>
+              <a:lumOff val="60000"/>
+            </a:schemeClr>
+          </a:solidFill>
+          <a:ln>
+            <a:solidFill>
+              <a:schemeClr val="tx1"/>
+            </a:solidFill>
+          </a:ln>
+        </p:spPr>
+        <p:style>
+          <a:lnRef idx="1">
+            <a:schemeClr val="accent1"/>
+          </a:lnRef>
+          <a:fillRef idx="3">
+            <a:schemeClr val="accent1"/>
+          </a:fillRef>
+          <a:effectRef idx="2">
+            <a:schemeClr val="accent1"/>
+          </a:effectRef>
+          <a:fontRef idx="minor">
+            <a:schemeClr val="lt1"/>
+          </a:fontRef>
+        </p:style>
+        <p:txBody>
+          <a:bodyPr rtlCol="0" anchor="ctr"/>
+          <a:lstStyle/>
+          <a:p>
+            <a:pPr algn="ctr"/>
+            <a:r>
+              <a:rPr lang="en-US" dirty="0">
+                <a:solidFill>
+                  <a:schemeClr val="tx1"/>
+                </a:solidFill>
+              </a:rPr>
+              <a:t>Eos test</a:t>
+            </a:r>
+          </a:p>
+        </p:txBody>
+      </p:sp>
+      <p:sp>
+        <p:nvSpPr>
+          <p:cNvPr id="3" name="TextBox 2">
+            <a:extLst>
+              <a:ext uri="{FF2B5EF4-FFF2-40B4-BE49-F238E27FC236}">
+                <a16:creationId xmlns:a16="http://schemas.microsoft.com/office/drawing/2014/main" id="{EA2BEC30-2CA8-E946-81D4-8C60BCD9EF89}"/>
+              </a:ext>
+            </a:extLst>
+          </p:cNvPr>
+          <p:cNvSpPr txBox="1"/>
+          <p:nvPr/>
+        </p:nvSpPr>
+        <p:spPr>
+          <a:xfrm>
+            <a:off x="4880156" y="4969802"/>
+            <a:ext cx="6229334" cy="433965"/>
+          </a:xfrm>
+          <a:prstGeom prst="rect">
+            <a:avLst/>
+          </a:prstGeom>
+          <a:noFill/>
+        </p:spPr>
+        <p:txBody>
+          <a:bodyPr wrap="none" lIns="118872" tIns="91440" rIns="118872" bIns="91440" rtlCol="0" anchor="ctr" anchorCtr="0">
+            <a:spAutoFit/>
+          </a:bodyPr>
+          <a:lstStyle/>
+          <a:p>
+            <a:pPr algn="l">
+              <a:lnSpc>
+                <a:spcPct val="90000"/>
+              </a:lnSpc>
+            </a:pPr>
+            <a:r>
+              <a:rPr lang="en-US" dirty="0"/>
+              <a:t>Next, build an EOS Test – is E(V,T) consistent with P(V,T)?</a:t>
+            </a:r>
+          </a:p>
+        </p:txBody>
+      </p:sp>
+      <p:grpSp>
+        <p:nvGrpSpPr>
+          <p:cNvPr id="9" name="Group 8">
+            <a:extLst>
+              <a:ext uri="{FF2B5EF4-FFF2-40B4-BE49-F238E27FC236}">
+                <a16:creationId xmlns:a16="http://schemas.microsoft.com/office/drawing/2014/main" id="{85793508-B53B-654E-95B1-E2E34F1DE3B4}"/>
+              </a:ext>
+            </a:extLst>
+          </p:cNvPr>
+          <p:cNvGrpSpPr/>
+          <p:nvPr/>
+        </p:nvGrpSpPr>
+        <p:grpSpPr>
+          <a:xfrm>
+            <a:off x="6505642" y="2237359"/>
+            <a:ext cx="2079986" cy="1631092"/>
+            <a:chOff x="9658247" y="3805881"/>
+            <a:chExt cx="2079986" cy="1631092"/>
+          </a:xfrm>
+        </p:grpSpPr>
+        <p:sp>
+          <p:nvSpPr>
+            <p:cNvPr id="10" name="Rectangle 9">
+              <a:extLst>
+                <a:ext uri="{FF2B5EF4-FFF2-40B4-BE49-F238E27FC236}">
+                  <a16:creationId xmlns:a16="http://schemas.microsoft.com/office/drawing/2014/main" id="{F1BC5DAF-FB6C-E846-8754-C13ADB909601}"/>
+                </a:ext>
+              </a:extLst>
+            </p:cNvPr>
+            <p:cNvSpPr/>
+            <p:nvPr/>
+          </p:nvSpPr>
+          <p:spPr>
+            <a:xfrm>
+              <a:off x="9658247" y="3805881"/>
+              <a:ext cx="2079986" cy="1631092"/>
+            </a:xfrm>
+            <a:prstGeom prst="rect">
+              <a:avLst/>
+            </a:prstGeom>
+            <a:solidFill>
+              <a:schemeClr val="accent3">
+                <a:alpha val="58000"/>
+              </a:schemeClr>
+            </a:solidFill>
+            <a:ln>
+              <a:noFill/>
+            </a:ln>
+            <a:effectLst>
+              <a:outerShdw blurRad="44450" dist="27940" dir="5400000" algn="ctr">
+                <a:srgbClr val="000000">
+                  <a:alpha val="32000"/>
+                </a:srgbClr>
+              </a:outerShdw>
+            </a:effectLst>
+          </p:spPr>
+          <p:txBody>
+            <a:bodyPr rot="0" spcFirstLastPara="0" vertOverflow="overflow" horzOverflow="overflow" vert="horz" wrap="square" lIns="121851" tIns="60925" rIns="121851" bIns="60925" numCol="1" spcCol="0" rtlCol="0" fromWordArt="0" anchor="ctr" anchorCtr="0" forceAA="0" compatLnSpc="1">
+              <a:prstTxWarp prst="textNoShape">
+                <a:avLst/>
+              </a:prstTxWarp>
+              <a:noAutofit/>
+            </a:bodyPr>
+            <a:lstStyle/>
+            <a:p>
+              <a:pPr algn="ctr">
+                <a:lnSpc>
+                  <a:spcPct val="90000"/>
+                </a:lnSpc>
+              </a:pPr>
+              <a:endParaRPr lang="en-US" sz="2000" dirty="0">
+                <a:solidFill>
+                  <a:schemeClr val="bg1"/>
+                </a:solidFill>
+              </a:endParaRPr>
+            </a:p>
+          </p:txBody>
+        </p:sp>
+        <p:sp>
+          <p:nvSpPr>
+            <p:cNvPr id="11" name="Rectangle 10">
+              <a:extLst>
+                <a:ext uri="{FF2B5EF4-FFF2-40B4-BE49-F238E27FC236}">
+                  <a16:creationId xmlns:a16="http://schemas.microsoft.com/office/drawing/2014/main" id="{674E4AB0-5EBC-A14F-93BE-2A60B4418EA4}"/>
+                </a:ext>
+              </a:extLst>
+            </p:cNvPr>
+            <p:cNvSpPr/>
+            <p:nvPr/>
+          </p:nvSpPr>
+          <p:spPr>
+            <a:xfrm>
+              <a:off x="10056889" y="4079744"/>
+              <a:ext cx="1285103" cy="1083365"/>
+            </a:xfrm>
+            <a:prstGeom prst="rect">
+              <a:avLst/>
+            </a:prstGeom>
+            <a:solidFill>
+              <a:srgbClr val="FF0000"/>
+            </a:solidFill>
+            <a:ln>
+              <a:noFill/>
+            </a:ln>
+            <a:effectLst>
+              <a:outerShdw blurRad="44450" dist="27940" dir="5400000" algn="ctr">
+                <a:srgbClr val="000000">
+                  <a:alpha val="32000"/>
+                </a:srgbClr>
+              </a:outerShdw>
+            </a:effectLst>
+          </p:spPr>
+          <p:txBody>
+            <a:bodyPr rot="0" spcFirstLastPara="0" vertOverflow="overflow" horzOverflow="overflow" vert="horz" wrap="square" lIns="121851" tIns="60925" rIns="121851" bIns="60925" numCol="1" spcCol="0" rtlCol="0" fromWordArt="0" anchor="ctr" anchorCtr="0" forceAA="0" compatLnSpc="1">
+              <a:prstTxWarp prst="textNoShape">
+                <a:avLst/>
+              </a:prstTxWarp>
+              <a:noAutofit/>
+            </a:bodyPr>
+            <a:lstStyle/>
+            <a:p>
+              <a:pPr algn="ctr">
+                <a:lnSpc>
+                  <a:spcPct val="90000"/>
+                </a:lnSpc>
+              </a:pPr>
+              <a:r>
+                <a:rPr lang="en-US" sz="2000" dirty="0">
+                  <a:solidFill>
+                    <a:schemeClr val="bg1"/>
+                  </a:solidFill>
+                </a:rPr>
+                <a:t>rank 3</a:t>
+              </a:r>
+            </a:p>
+          </p:txBody>
+        </p:sp>
+      </p:grpSp>
+      <p:grpSp>
+        <p:nvGrpSpPr>
+          <p:cNvPr id="12" name="Group 11">
+            <a:extLst>
+              <a:ext uri="{FF2B5EF4-FFF2-40B4-BE49-F238E27FC236}">
+                <a16:creationId xmlns:a16="http://schemas.microsoft.com/office/drawing/2014/main" id="{2348CE2A-6110-8E44-A7B1-762FE7CAAC53}"/>
+              </a:ext>
+            </a:extLst>
+          </p:cNvPr>
+          <p:cNvGrpSpPr/>
+          <p:nvPr/>
+        </p:nvGrpSpPr>
+        <p:grpSpPr>
+          <a:xfrm>
+            <a:off x="7789106" y="1180370"/>
+            <a:ext cx="2079986" cy="1631092"/>
+            <a:chOff x="9658247" y="3805881"/>
+            <a:chExt cx="2079986" cy="1631092"/>
+          </a:xfrm>
+        </p:grpSpPr>
+        <p:sp>
+          <p:nvSpPr>
+            <p:cNvPr id="13" name="Rectangle 12">
+              <a:extLst>
+                <a:ext uri="{FF2B5EF4-FFF2-40B4-BE49-F238E27FC236}">
+                  <a16:creationId xmlns:a16="http://schemas.microsoft.com/office/drawing/2014/main" id="{18E08F0C-3C42-FE43-817A-850D8252FDA8}"/>
+                </a:ext>
+              </a:extLst>
+            </p:cNvPr>
+            <p:cNvSpPr/>
+            <p:nvPr/>
+          </p:nvSpPr>
+          <p:spPr>
+            <a:xfrm>
+              <a:off x="9658247" y="3805881"/>
+              <a:ext cx="2079986" cy="1631092"/>
+            </a:xfrm>
+            <a:prstGeom prst="rect">
+              <a:avLst/>
+            </a:prstGeom>
+            <a:solidFill>
+              <a:schemeClr val="accent3">
+                <a:alpha val="58000"/>
+              </a:schemeClr>
+            </a:solidFill>
+            <a:ln>
+              <a:noFill/>
+            </a:ln>
+            <a:effectLst>
+              <a:outerShdw blurRad="44450" dist="27940" dir="5400000" algn="ctr">
+                <a:srgbClr val="000000">
+                  <a:alpha val="32000"/>
+                </a:srgbClr>
+              </a:outerShdw>
+            </a:effectLst>
+          </p:spPr>
+          <p:txBody>
+            <a:bodyPr rot="0" spcFirstLastPara="0" vertOverflow="overflow" horzOverflow="overflow" vert="horz" wrap="square" lIns="121851" tIns="60925" rIns="121851" bIns="60925" numCol="1" spcCol="0" rtlCol="0" fromWordArt="0" anchor="ctr" anchorCtr="0" forceAA="0" compatLnSpc="1">
+              <a:prstTxWarp prst="textNoShape">
+                <a:avLst/>
+              </a:prstTxWarp>
+              <a:noAutofit/>
+            </a:bodyPr>
+            <a:lstStyle/>
+            <a:p>
+              <a:pPr algn="ctr">
+                <a:lnSpc>
+                  <a:spcPct val="90000"/>
+                </a:lnSpc>
+              </a:pPr>
+              <a:endParaRPr lang="en-US" sz="2000" dirty="0">
+                <a:solidFill>
+                  <a:schemeClr val="bg1"/>
+                </a:solidFill>
+              </a:endParaRPr>
+            </a:p>
+          </p:txBody>
+        </p:sp>
+        <p:sp>
+          <p:nvSpPr>
+            <p:cNvPr id="14" name="Rectangle 13">
+              <a:extLst>
+                <a:ext uri="{FF2B5EF4-FFF2-40B4-BE49-F238E27FC236}">
+                  <a16:creationId xmlns:a16="http://schemas.microsoft.com/office/drawing/2014/main" id="{8E56C841-8950-C544-BBEF-292FA2BFD703}"/>
+                </a:ext>
+              </a:extLst>
+            </p:cNvPr>
+            <p:cNvSpPr/>
+            <p:nvPr/>
+          </p:nvSpPr>
+          <p:spPr>
+            <a:xfrm>
+              <a:off x="10056889" y="4079744"/>
+              <a:ext cx="1285103" cy="1083365"/>
+            </a:xfrm>
+            <a:prstGeom prst="rect">
+              <a:avLst/>
+            </a:prstGeom>
+            <a:solidFill>
+              <a:srgbClr val="FF0000"/>
+            </a:solidFill>
+            <a:ln>
+              <a:noFill/>
+            </a:ln>
+            <a:effectLst>
+              <a:outerShdw blurRad="44450" dist="27940" dir="5400000" algn="ctr">
+                <a:srgbClr val="000000">
+                  <a:alpha val="32000"/>
+                </a:srgbClr>
+              </a:outerShdw>
+            </a:effectLst>
+          </p:spPr>
+          <p:txBody>
+            <a:bodyPr rot="0" spcFirstLastPara="0" vertOverflow="overflow" horzOverflow="overflow" vert="horz" wrap="square" lIns="121851" tIns="60925" rIns="121851" bIns="60925" numCol="1" spcCol="0" rtlCol="0" fromWordArt="0" anchor="ctr" anchorCtr="0" forceAA="0" compatLnSpc="1">
+              <a:prstTxWarp prst="textNoShape">
+                <a:avLst/>
+              </a:prstTxWarp>
+              <a:noAutofit/>
+            </a:bodyPr>
+            <a:lstStyle/>
+            <a:p>
+              <a:pPr algn="ctr">
+                <a:lnSpc>
+                  <a:spcPct val="90000"/>
+                </a:lnSpc>
+              </a:pPr>
+              <a:r>
+                <a:rPr lang="en-US" sz="2000" dirty="0">
+                  <a:solidFill>
+                    <a:schemeClr val="bg1"/>
+                  </a:solidFill>
+                </a:rPr>
+                <a:t>rank 2</a:t>
+              </a:r>
+            </a:p>
+          </p:txBody>
+        </p:sp>
+      </p:grpSp>
+      <p:sp>
+        <p:nvSpPr>
+          <p:cNvPr id="15" name="TextBox 14">
+            <a:extLst>
+              <a:ext uri="{FF2B5EF4-FFF2-40B4-BE49-F238E27FC236}">
+                <a16:creationId xmlns:a16="http://schemas.microsoft.com/office/drawing/2014/main" id="{A8555D94-28CA-8244-A3F4-18ED0B844E35}"/>
+              </a:ext>
+            </a:extLst>
+          </p:cNvPr>
+          <p:cNvSpPr txBox="1"/>
+          <p:nvPr/>
+        </p:nvSpPr>
+        <p:spPr>
+          <a:xfrm>
+            <a:off x="8626426" y="2902167"/>
+            <a:ext cx="1201867" cy="433965"/>
+          </a:xfrm>
+          <a:prstGeom prst="rect">
+            <a:avLst/>
+          </a:prstGeom>
+          <a:noFill/>
+        </p:spPr>
+        <p:txBody>
+          <a:bodyPr wrap="none" lIns="118872" tIns="91440" rIns="118872" bIns="91440" rtlCol="0" anchor="ctr" anchorCtr="0">
+            <a:spAutoFit/>
+          </a:bodyPr>
+          <a:lstStyle/>
+          <a:p>
+            <a:pPr algn="l">
+              <a:lnSpc>
+                <a:spcPct val="90000"/>
+              </a:lnSpc>
+            </a:pPr>
+            <a:r>
+              <a:rPr lang="en-US" dirty="0"/>
+              <a:t>halo cells</a:t>
+            </a:r>
+          </a:p>
+        </p:txBody>
+      </p:sp>
+    </p:spTree>
+    <p:custDataLst>
+      <p:tags r:id="rId1"/>
+    </p:custDataLst>
+    <p:extLst>
+      <p:ext uri="{BB962C8B-B14F-4D97-AF65-F5344CB8AC3E}">
+        <p14:creationId xmlns:p14="http://schemas.microsoft.com/office/powerpoint/2010/main" val="2442379966"/>
+      </p:ext>
+    </p:extLst>
+  </p:cSld>
+  <p:clrMapOvr>
+    <a:masterClrMapping/>
+  </p:clrMapOvr>
+</p:sld>
+</file>
+
+<file path=ppt/slides/slide12.xml><?xml version="1.0" encoding="utf-8"?>
+<p:sld xmlns:a="http://schemas.openxmlformats.org/drawingml/2006/main" xmlns:r="http://schemas.openxmlformats.org/officeDocument/2006/relationships" xmlns:p="http://schemas.openxmlformats.org/presentationml/2006/main">
+  <p:cSld>
+    <p:spTree>
+      <p:nvGrpSpPr>
+        <p:cNvPr id="1" name=""/>
+        <p:cNvGrpSpPr/>
+        <p:nvPr/>
+      </p:nvGrpSpPr>
+      <p:grpSpPr>
+        <a:xfrm>
+          <a:off x="0" y="0"/>
+          <a:ext cx="0" cy="0"/>
+          <a:chOff x="0" y="0"/>
+          <a:chExt cx="0" cy="0"/>
+        </a:xfrm>
+      </p:grpSpPr>
+      <p:sp>
+        <p:nvSpPr>
           <p:cNvPr id="5" name="Content Placeholder 4"/>
           <p:cNvSpPr>
             <a:spLocks noGrp="1"/>
@@ -5876,12 +7535,6 @@
             <a:r>
               <a:rPr lang="en-US" dirty="0"/>
               <a:t>Shock moves out spherically</a:t>
-            </a:r>
-          </a:p>
-          <a:p>
-            <a:r>
-              <a:rPr lang="en-US" dirty="0"/>
-              <a:t>FLASH with AMR and hydro</a:t>
             </a:r>
           </a:p>
           <a:p>
@@ -5930,7 +7583,7 @@
           <a:noFill/>
           <a:extLst>
             <a:ext uri="{909E8E84-426E-40dd-AFC4-6F175D3DCCD1}">
-              <a14:hiddenFill xmlns="" xmlns:a14="http://schemas.microsoft.com/office/drawing/2010/main">
+              <a14:hiddenFill xmlns:a14="http://schemas.microsoft.com/office/drawing/2010/main" xmlns="">
                 <a:solidFill>
                   <a:srgbClr val="FFFFFF"/>
                 </a:solidFill>
@@ -6578,7 +8231,7 @@
 </p:sld>
 </file>
 
-<file path=ppt/slides/slide11.xml><?xml version="1.0" encoding="utf-8"?>
+<file path=ppt/slides/slide13.xml><?xml version="1.0" encoding="utf-8"?>
 <p:sld xmlns:a="http://schemas.openxmlformats.org/drawingml/2006/main" xmlns:r="http://schemas.openxmlformats.org/officeDocument/2006/relationships" xmlns:p="http://schemas.openxmlformats.org/presentationml/2006/main">
   <p:cSld>
     <p:spTree>
@@ -6956,7 +8609,7 @@
 </p:sld>
 </file>
 
-<file path=ppt/slides/slide12.xml><?xml version="1.0" encoding="utf-8"?>
+<file path=ppt/slides/slide14.xml><?xml version="1.0" encoding="utf-8"?>
 <p:sld xmlns:a="http://schemas.openxmlformats.org/drawingml/2006/main" xmlns:r="http://schemas.openxmlformats.org/officeDocument/2006/relationships" xmlns:p="http://schemas.openxmlformats.org/presentationml/2006/main">
   <p:cSld>
     <p:spTree>
@@ -6990,7 +8643,15 @@
           <a:p>
             <a:r>
               <a:rPr lang="en-US" dirty="0"/>
-              <a:t>Example 4: Coverage Matrix (physics vs. functionalities)</a:t>
+              <a:t>Example 4: Coverage Matrix (</a:t>
+            </a:r>
+            <a:r>
+              <a:rPr lang="en-US" dirty="0" err="1"/>
+              <a:t>Interoperabilities</a:t>
+            </a:r>
+            <a:r>
+              <a:rPr lang="en-US" dirty="0"/>
+              <a:t>)</a:t>
             </a:r>
           </a:p>
         </p:txBody>
@@ -8106,7 +9767,7 @@
 </p:sld>
 </file>
 
-<file path=ppt/slides/slide13.xml><?xml version="1.0" encoding="utf-8"?>
+<file path=ppt/slides/slide15.xml><?xml version="1.0" encoding="utf-8"?>
 <p:sld xmlns:a="http://schemas.openxmlformats.org/drawingml/2006/main" xmlns:r="http://schemas.openxmlformats.org/officeDocument/2006/relationships" xmlns:p="http://schemas.openxmlformats.org/presentationml/2006/main">
   <p:cSld>
     <p:spTree>
@@ -8837,19 +10498,169 @@
           </a:p>
           <a:p>
             <a:r>
-              <a:rPr lang="en-US" b="1" dirty="0">
-                <a:solidFill>
-                  <a:schemeClr val="bg1"/>
-                </a:solidFill>
-                <a:highlight>
-                  <a:srgbClr val="43B1E5"/>
-                </a:highlight>
-              </a:rPr>
-              <a:t>Team Meeting!</a:t>
-            </a:r>
-            <a:r>
               <a:rPr lang="en-US" dirty="0"/>
-              <a:t> Evaluate project needs:</a:t>
+              <a:t>Evaluate project needs:</a:t>
+            </a:r>
+          </a:p>
+          <a:p>
+            <a:pPr lvl="1"/>
+            <a:r>
+              <a:rPr lang="en-US" dirty="0"/>
+              <a:t>Objectives: expected use of the code</a:t>
+            </a:r>
+          </a:p>
+          <a:p>
+            <a:pPr lvl="1"/>
+            <a:r>
+              <a:rPr lang="en-US" dirty="0"/>
+              <a:t>Lifecycle stage: new or production or refactoring</a:t>
+            </a:r>
+          </a:p>
+          <a:p>
+            <a:pPr lvl="1"/>
+            <a:r>
+              <a:rPr lang="en-US" dirty="0"/>
+              <a:t>Team: size and degree of heterogeneity</a:t>
+            </a:r>
+          </a:p>
+          <a:p>
+            <a:pPr lvl="1"/>
+            <a:r>
+              <a:rPr lang="en-US" dirty="0"/>
+              <a:t>Lifetime: one off or ongoing production</a:t>
+            </a:r>
+          </a:p>
+          <a:p>
+            <a:pPr lvl="1"/>
+            <a:r>
+              <a:rPr lang="en-US" dirty="0"/>
+              <a:t>Complexity: modules and their interactions</a:t>
+            </a:r>
+          </a:p>
+          <a:p>
+            <a:pPr lvl="1"/>
+            <a:endParaRPr lang="en-US" dirty="0"/>
+          </a:p>
+        </p:txBody>
+      </p:sp>
+    </p:spTree>
+    <p:extLst>
+      <p:ext uri="{BB962C8B-B14F-4D97-AF65-F5344CB8AC3E}">
+        <p14:creationId xmlns:p14="http://schemas.microsoft.com/office/powerpoint/2010/main" val="3445731576"/>
+      </p:ext>
+    </p:extLst>
+  </p:cSld>
+  <p:clrMapOvr>
+    <a:masterClrMapping/>
+  </p:clrMapOvr>
+</p:sld>
+</file>
+
+<file path=ppt/slides/slide5.xml><?xml version="1.0" encoding="utf-8"?>
+<p:sld xmlns:a="http://schemas.openxmlformats.org/drawingml/2006/main" xmlns:r="http://schemas.openxmlformats.org/officeDocument/2006/relationships" xmlns:p="http://schemas.openxmlformats.org/presentationml/2006/main">
+  <p:cSld>
+    <p:spTree>
+      <p:nvGrpSpPr>
+        <p:cNvPr id="1" name=""/>
+        <p:cNvGrpSpPr/>
+        <p:nvPr/>
+      </p:nvGrpSpPr>
+      <p:grpSpPr>
+        <a:xfrm>
+          <a:off x="0" y="0"/>
+          <a:ext cx="0" cy="0"/>
+          <a:chOff x="0" y="0"/>
+          <a:chExt cx="0" cy="0"/>
+        </a:xfrm>
+      </p:grpSpPr>
+      <p:sp>
+        <p:nvSpPr>
+          <p:cNvPr id="2" name="Title 1"/>
+          <p:cNvSpPr>
+            <a:spLocks noGrp="1"/>
+          </p:cNvSpPr>
+          <p:nvPr>
+            <p:ph type="title"/>
+          </p:nvPr>
+        </p:nvSpPr>
+        <p:spPr/>
+        <p:txBody>
+          <a:bodyPr>
+            <a:normAutofit/>
+          </a:bodyPr>
+          <a:lstStyle/>
+          <a:p>
+            <a:r>
+              <a:rPr lang="en-US" dirty="0"/>
+              <a:t>Why not always use the most stringent testing?</a:t>
+            </a:r>
+          </a:p>
+        </p:txBody>
+      </p:sp>
+      <p:sp>
+        <p:nvSpPr>
+          <p:cNvPr id="5" name="Content Placeholder 4"/>
+          <p:cNvSpPr>
+            <a:spLocks noGrp="1"/>
+          </p:cNvSpPr>
+          <p:nvPr>
+            <p:ph sz="quarter" idx="1"/>
+          </p:nvPr>
+        </p:nvSpPr>
+        <p:spPr>
+          <a:xfrm>
+            <a:off x="368424" y="1039350"/>
+            <a:ext cx="11534016" cy="5407170"/>
+          </a:xfrm>
+        </p:spPr>
+        <p:txBody>
+          <a:bodyPr>
+            <a:normAutofit/>
+          </a:bodyPr>
+          <a:lstStyle/>
+          <a:p>
+            <a:r>
+              <a:rPr lang="en-US" dirty="0"/>
+              <a:t>Effort spent in devising running and maintaining test suite is a tax on team resources</a:t>
+            </a:r>
+          </a:p>
+          <a:p>
+            <a:r>
+              <a:rPr lang="en-US" dirty="0"/>
+              <a:t>When the tax is too high…</a:t>
+            </a:r>
+          </a:p>
+          <a:p>
+            <a:pPr lvl="1"/>
+            <a:r>
+              <a:rPr lang="en-US" dirty="0"/>
+              <a:t>Team cannot meet code-use objectives</a:t>
+            </a:r>
+          </a:p>
+          <a:p>
+            <a:r>
+              <a:rPr lang="en-US" dirty="0"/>
+              <a:t>When is the tax is too low…</a:t>
+            </a:r>
+          </a:p>
+          <a:p>
+            <a:pPr lvl="1"/>
+            <a:r>
+              <a:rPr lang="en-US" dirty="0"/>
+              <a:t>Necessary oversight not provided</a:t>
+            </a:r>
+          </a:p>
+          <a:p>
+            <a:pPr lvl="1"/>
+            <a:r>
+              <a:rPr lang="en-US" dirty="0"/>
+              <a:t>Defects in code sneak through </a:t>
+            </a:r>
+          </a:p>
+          <a:p>
+            <a:r>
+              <a:rPr lang="en-US" dirty="0"/>
+              <a:t>Evaluate project needs:</a:t>
             </a:r>
           </a:p>
           <a:p>
@@ -8895,10 +10706,10 @@
       </p:sp>
       <p:grpSp>
         <p:nvGrpSpPr>
-          <p:cNvPr id="8" name="Group 7">
+          <p:cNvPr id="13" name="Group 12">
             <a:extLst>
               <a:ext uri="{FF2B5EF4-FFF2-40B4-BE49-F238E27FC236}">
-                <a16:creationId xmlns:a16="http://schemas.microsoft.com/office/drawing/2014/main" id="{4F52AD71-49C7-F743-AB85-85CD4BA5138B}"/>
+                <a16:creationId xmlns:a16="http://schemas.microsoft.com/office/drawing/2014/main" id="{7AF58521-B1AC-5E47-9164-88FD3B0E02D7}"/>
               </a:ext>
             </a:extLst>
           </p:cNvPr>
@@ -8907,7 +10718,7 @@
         </p:nvGrpSpPr>
         <p:grpSpPr>
           <a:xfrm>
-            <a:off x="8374783" y="4201194"/>
+            <a:off x="7285571" y="3429000"/>
             <a:ext cx="2079986" cy="1631092"/>
             <a:chOff x="9658247" y="3805881"/>
             <a:chExt cx="2079986" cy="1631092"/>
@@ -8915,10 +10726,10 @@
         </p:grpSpPr>
         <p:sp>
           <p:nvSpPr>
-            <p:cNvPr id="7" name="Rectangle 6">
+            <p:cNvPr id="14" name="Rectangle 13">
               <a:extLst>
                 <a:ext uri="{FF2B5EF4-FFF2-40B4-BE49-F238E27FC236}">
-                  <a16:creationId xmlns:a16="http://schemas.microsoft.com/office/drawing/2014/main" id="{21CD3229-5C0E-644A-9E27-95DBEE5BDB8C}"/>
+                  <a16:creationId xmlns:a16="http://schemas.microsoft.com/office/drawing/2014/main" id="{EE85394E-309A-F943-BDEF-2ADC56C17863}"/>
                 </a:ext>
               </a:extLst>
             </p:cNvPr>
@@ -8973,10 +10784,10 @@
         </p:sp>
         <p:sp>
           <p:nvSpPr>
-            <p:cNvPr id="4" name="Rectangle 3">
+            <p:cNvPr id="15" name="Rectangle 14">
               <a:extLst>
                 <a:ext uri="{FF2B5EF4-FFF2-40B4-BE49-F238E27FC236}">
-                  <a16:creationId xmlns:a16="http://schemas.microsoft.com/office/drawing/2014/main" id="{C391ED94-7A5C-414B-8853-D5F0C063BB90}"/>
+                  <a16:creationId xmlns:a16="http://schemas.microsoft.com/office/drawing/2014/main" id="{FFCDAFAD-ACE4-AD44-901D-940B38E05444}"/>
                 </a:ext>
               </a:extLst>
             </p:cNvPr>
@@ -9033,10 +10844,10 @@
       </p:grpSp>
       <p:grpSp>
         <p:nvGrpSpPr>
-          <p:cNvPr id="9" name="Group 8">
+          <p:cNvPr id="16" name="Group 15">
             <a:extLst>
               <a:ext uri="{FF2B5EF4-FFF2-40B4-BE49-F238E27FC236}">
-                <a16:creationId xmlns:a16="http://schemas.microsoft.com/office/drawing/2014/main" id="{9D9D52F9-164F-C14E-AF03-DD3B5FF29853}"/>
+                <a16:creationId xmlns:a16="http://schemas.microsoft.com/office/drawing/2014/main" id="{ABDDE89E-97EF-0147-AD24-787A3428E32E}"/>
               </a:ext>
             </a:extLst>
           </p:cNvPr>
@@ -9045,7 +10856,7 @@
         </p:nvGrpSpPr>
         <p:grpSpPr>
           <a:xfrm>
-            <a:off x="9658247" y="3144205"/>
+            <a:off x="8569035" y="2372011"/>
             <a:ext cx="2079986" cy="1631092"/>
             <a:chOff x="9658247" y="3805881"/>
             <a:chExt cx="2079986" cy="1631092"/>
@@ -9053,10 +10864,10 @@
         </p:grpSpPr>
         <p:sp>
           <p:nvSpPr>
-            <p:cNvPr id="10" name="Rectangle 9">
+            <p:cNvPr id="17" name="Rectangle 16">
               <a:extLst>
                 <a:ext uri="{FF2B5EF4-FFF2-40B4-BE49-F238E27FC236}">
-                  <a16:creationId xmlns:a16="http://schemas.microsoft.com/office/drawing/2014/main" id="{77CCBD93-666E-C549-9297-51219A2BBC13}"/>
+                  <a16:creationId xmlns:a16="http://schemas.microsoft.com/office/drawing/2014/main" id="{50DB1FE8-633C-8B44-8FD2-CD97039954E0}"/>
                 </a:ext>
               </a:extLst>
             </p:cNvPr>
@@ -9111,10 +10922,10 @@
         </p:sp>
         <p:sp>
           <p:nvSpPr>
-            <p:cNvPr id="11" name="Rectangle 10">
+            <p:cNvPr id="18" name="Rectangle 17">
               <a:extLst>
                 <a:ext uri="{FF2B5EF4-FFF2-40B4-BE49-F238E27FC236}">
-                  <a16:creationId xmlns:a16="http://schemas.microsoft.com/office/drawing/2014/main" id="{4505E698-532E-6E49-A9DB-2E823F84AF90}"/>
+                  <a16:creationId xmlns:a16="http://schemas.microsoft.com/office/drawing/2014/main" id="{42B1DC2B-676A-EE4C-B7DA-36702D7B1BAA}"/>
                 </a:ext>
               </a:extLst>
             </p:cNvPr>
@@ -9171,10 +10982,10 @@
       </p:grpSp>
       <p:sp>
         <p:nvSpPr>
-          <p:cNvPr id="12" name="TextBox 11">
+          <p:cNvPr id="19" name="TextBox 18">
             <a:extLst>
               <a:ext uri="{FF2B5EF4-FFF2-40B4-BE49-F238E27FC236}">
-                <a16:creationId xmlns:a16="http://schemas.microsoft.com/office/drawing/2014/main" id="{4DFF52E9-D81A-FC4B-A3C2-D1EA25461CDB}"/>
+                <a16:creationId xmlns:a16="http://schemas.microsoft.com/office/drawing/2014/main" id="{6143545E-E4DC-5A46-8FC4-5C67CE9F08FD}"/>
               </a:ext>
             </a:extLst>
           </p:cNvPr>
@@ -9183,7 +10994,7 @@
         </p:nvSpPr>
         <p:spPr>
           <a:xfrm>
-            <a:off x="10077604" y="4424679"/>
+            <a:off x="9406355" y="4093808"/>
             <a:ext cx="1201867" cy="433965"/>
           </a:xfrm>
           <a:prstGeom prst="rect">
@@ -9212,159 +11023,7 @@
     </p:spTree>
     <p:extLst>
       <p:ext uri="{BB962C8B-B14F-4D97-AF65-F5344CB8AC3E}">
-        <p14:creationId xmlns:p14="http://schemas.microsoft.com/office/powerpoint/2010/main" val="3445731576"/>
-      </p:ext>
-    </p:extLst>
-  </p:cSld>
-  <p:clrMapOvr>
-    <a:masterClrMapping/>
-  </p:clrMapOvr>
-</p:sld>
-</file>
-
-<file path=ppt/slides/slide5.xml><?xml version="1.0" encoding="utf-8"?>
-<p:sld xmlns:a="http://schemas.openxmlformats.org/drawingml/2006/main" xmlns:r="http://schemas.openxmlformats.org/officeDocument/2006/relationships" xmlns:p="http://schemas.openxmlformats.org/presentationml/2006/main">
-  <p:cSld>
-    <p:spTree>
-      <p:nvGrpSpPr>
-        <p:cNvPr id="1" name=""/>
-        <p:cNvGrpSpPr/>
-        <p:nvPr/>
-      </p:nvGrpSpPr>
-      <p:grpSpPr>
-        <a:xfrm>
-          <a:off x="0" y="0"/>
-          <a:ext cx="0" cy="0"/>
-          <a:chOff x="0" y="0"/>
-          <a:chExt cx="0" cy="0"/>
-        </a:xfrm>
-      </p:grpSpPr>
-      <p:sp>
-        <p:nvSpPr>
-          <p:cNvPr id="2" name="Title 1"/>
-          <p:cNvSpPr>
-            <a:spLocks noGrp="1"/>
-          </p:cNvSpPr>
-          <p:nvPr>
-            <p:ph type="title"/>
-          </p:nvPr>
-        </p:nvSpPr>
-        <p:spPr/>
-        <p:txBody>
-          <a:bodyPr/>
-          <a:lstStyle/>
-          <a:p>
-            <a:r>
-              <a:rPr lang="en-US" dirty="0"/>
-              <a:t>Additional Notes: Good Testing Practices</a:t>
-            </a:r>
-            <a:br>
-              <a:rPr lang="en-US" dirty="0"/>
-            </a:br>
-            <a:endParaRPr lang="en-US" dirty="0"/>
-          </a:p>
-        </p:txBody>
-      </p:sp>
-      <p:sp>
-        <p:nvSpPr>
-          <p:cNvPr id="5" name="Content Placeholder 4"/>
-          <p:cNvSpPr>
-            <a:spLocks noGrp="1"/>
-          </p:cNvSpPr>
-          <p:nvPr>
-            <p:ph sz="quarter" idx="1"/>
-          </p:nvPr>
-        </p:nvSpPr>
-        <p:spPr>
-          <a:xfrm>
-            <a:off x="368424" y="1177290"/>
-            <a:ext cx="11369809" cy="4047778"/>
-          </a:xfrm>
-        </p:spPr>
-        <p:txBody>
-          <a:bodyPr/>
-          <a:lstStyle/>
-          <a:p>
-            <a:r>
-              <a:rPr lang="en-US" dirty="0"/>
-              <a:t>Verify Code coverage</a:t>
-            </a:r>
-          </a:p>
-          <a:p>
-            <a:r>
-              <a:rPr lang="en-US" dirty="0"/>
-              <a:t>Must have consistent policy on dealing with failed tests</a:t>
-            </a:r>
-          </a:p>
-          <a:p>
-            <a:pPr lvl="1"/>
-            <a:r>
-              <a:rPr lang="en-US" dirty="0"/>
-              <a:t>Issue tracking</a:t>
-            </a:r>
-          </a:p>
-          <a:p>
-            <a:pPr lvl="2"/>
-            <a:r>
-              <a:rPr lang="en-US" dirty="0"/>
-              <a:t>How quickly does it need to be fixed?</a:t>
-            </a:r>
-          </a:p>
-          <a:p>
-            <a:pPr lvl="2"/>
-            <a:r>
-              <a:rPr lang="en-US" dirty="0"/>
-              <a:t>Who is responsible for fixing it?</a:t>
-            </a:r>
-          </a:p>
-          <a:p>
-            <a:r>
-              <a:rPr lang="en-US" dirty="0"/>
-              <a:t>Someone should be watching the test suite</a:t>
-            </a:r>
-          </a:p>
-          <a:p>
-            <a:r>
-              <a:rPr lang="en-US" dirty="0"/>
-              <a:t>When refactoring or adding new features, run a regression suite before check in</a:t>
-            </a:r>
-          </a:p>
-          <a:p>
-            <a:pPr lvl="1"/>
-            <a:r>
-              <a:rPr lang="en-US" dirty="0"/>
-              <a:t>Add new regression tests or modify existing ones for the new features</a:t>
-            </a:r>
-          </a:p>
-          <a:p>
-            <a:r>
-              <a:rPr lang="en-US" dirty="0"/>
-              <a:t>Code review before releasing test suite is useful</a:t>
-            </a:r>
-          </a:p>
-          <a:p>
-            <a:pPr lvl="1"/>
-            <a:r>
-              <a:rPr lang="en-US" dirty="0"/>
-              <a:t>Another person may spot issues you didn’t</a:t>
-            </a:r>
-          </a:p>
-          <a:p>
-            <a:pPr lvl="1"/>
-            <a:r>
-              <a:rPr lang="en-US" dirty="0"/>
-              <a:t>Incredibly cost-effective</a:t>
-            </a:r>
-          </a:p>
-          <a:p>
-            <a:endParaRPr lang="en-US" dirty="0"/>
-          </a:p>
-        </p:txBody>
-      </p:sp>
-    </p:spTree>
-    <p:extLst>
-      <p:ext uri="{BB962C8B-B14F-4D97-AF65-F5344CB8AC3E}">
-        <p14:creationId xmlns:p14="http://schemas.microsoft.com/office/powerpoint/2010/main" val="2338338090"/>
+        <p14:creationId xmlns:p14="http://schemas.microsoft.com/office/powerpoint/2010/main" val="2798985827"/>
       </p:ext>
     </p:extLst>
   </p:cSld>
@@ -9408,6 +11067,158 @@
           <a:p>
             <a:r>
               <a:rPr lang="en-US" dirty="0"/>
+              <a:t>Additional Notes: Good Testing Practices</a:t>
+            </a:r>
+            <a:br>
+              <a:rPr lang="en-US" dirty="0"/>
+            </a:br>
+            <a:endParaRPr lang="en-US" dirty="0"/>
+          </a:p>
+        </p:txBody>
+      </p:sp>
+      <p:sp>
+        <p:nvSpPr>
+          <p:cNvPr id="5" name="Content Placeholder 4"/>
+          <p:cNvSpPr>
+            <a:spLocks noGrp="1"/>
+          </p:cNvSpPr>
+          <p:nvPr>
+            <p:ph sz="quarter" idx="1"/>
+          </p:nvPr>
+        </p:nvSpPr>
+        <p:spPr>
+          <a:xfrm>
+            <a:off x="368424" y="1177290"/>
+            <a:ext cx="11369809" cy="4047778"/>
+          </a:xfrm>
+        </p:spPr>
+        <p:txBody>
+          <a:bodyPr/>
+          <a:lstStyle/>
+          <a:p>
+            <a:r>
+              <a:rPr lang="en-US" dirty="0"/>
+              <a:t>Verify Code coverage</a:t>
+            </a:r>
+          </a:p>
+          <a:p>
+            <a:r>
+              <a:rPr lang="en-US" dirty="0"/>
+              <a:t>Must have consistent policy on dealing with failed tests</a:t>
+            </a:r>
+          </a:p>
+          <a:p>
+            <a:pPr lvl="1"/>
+            <a:r>
+              <a:rPr lang="en-US" dirty="0"/>
+              <a:t>Issue tracking</a:t>
+            </a:r>
+          </a:p>
+          <a:p>
+            <a:pPr lvl="2"/>
+            <a:r>
+              <a:rPr lang="en-US" dirty="0"/>
+              <a:t>How quickly does it need to be fixed?</a:t>
+            </a:r>
+          </a:p>
+          <a:p>
+            <a:pPr lvl="2"/>
+            <a:r>
+              <a:rPr lang="en-US" dirty="0"/>
+              <a:t>Who is responsible for fixing it?</a:t>
+            </a:r>
+          </a:p>
+          <a:p>
+            <a:r>
+              <a:rPr lang="en-US" dirty="0"/>
+              <a:t>Someone should be watching the test suite</a:t>
+            </a:r>
+          </a:p>
+          <a:p>
+            <a:r>
+              <a:rPr lang="en-US" dirty="0"/>
+              <a:t>When refactoring or adding new features, run a regression suite before check in</a:t>
+            </a:r>
+          </a:p>
+          <a:p>
+            <a:pPr lvl="1"/>
+            <a:r>
+              <a:rPr lang="en-US" dirty="0"/>
+              <a:t>Add new regression tests or modify existing ones for the new features</a:t>
+            </a:r>
+          </a:p>
+          <a:p>
+            <a:r>
+              <a:rPr lang="en-US" dirty="0"/>
+              <a:t>Code review before releasing test suite is useful</a:t>
+            </a:r>
+          </a:p>
+          <a:p>
+            <a:pPr lvl="1"/>
+            <a:r>
+              <a:rPr lang="en-US" dirty="0"/>
+              <a:t>Another person may spot issues you didn’t</a:t>
+            </a:r>
+          </a:p>
+          <a:p>
+            <a:pPr lvl="1"/>
+            <a:r>
+              <a:rPr lang="en-US" dirty="0"/>
+              <a:t>Incredibly cost-effective</a:t>
+            </a:r>
+          </a:p>
+          <a:p>
+            <a:endParaRPr lang="en-US" dirty="0"/>
+          </a:p>
+        </p:txBody>
+      </p:sp>
+    </p:spTree>
+    <p:extLst>
+      <p:ext uri="{BB962C8B-B14F-4D97-AF65-F5344CB8AC3E}">
+        <p14:creationId xmlns:p14="http://schemas.microsoft.com/office/powerpoint/2010/main" val="2338338090"/>
+      </p:ext>
+    </p:extLst>
+  </p:cSld>
+  <p:clrMapOvr>
+    <a:masterClrMapping/>
+  </p:clrMapOvr>
+</p:sld>
+</file>
+
+<file path=ppt/slides/slide7.xml><?xml version="1.0" encoding="utf-8"?>
+<p:sld xmlns:a="http://schemas.openxmlformats.org/drawingml/2006/main" xmlns:r="http://schemas.openxmlformats.org/officeDocument/2006/relationships" xmlns:p="http://schemas.openxmlformats.org/presentationml/2006/main">
+  <p:cSld>
+    <p:spTree>
+      <p:nvGrpSpPr>
+        <p:cNvPr id="1" name=""/>
+        <p:cNvGrpSpPr/>
+        <p:nvPr/>
+      </p:nvGrpSpPr>
+      <p:grpSpPr>
+        <a:xfrm>
+          <a:off x="0" y="0"/>
+          <a:ext cx="0" cy="0"/>
+          <a:chOff x="0" y="0"/>
+          <a:chExt cx="0" cy="0"/>
+        </a:xfrm>
+      </p:grpSpPr>
+      <p:sp>
+        <p:nvSpPr>
+          <p:cNvPr id="2" name="Title 1"/>
+          <p:cNvSpPr>
+            <a:spLocks noGrp="1"/>
+          </p:cNvSpPr>
+          <p:nvPr>
+            <p:ph type="title"/>
+          </p:nvPr>
+        </p:nvSpPr>
+        <p:spPr/>
+        <p:txBody>
+          <a:bodyPr/>
+          <a:lstStyle/>
+          <a:p>
+            <a:r>
+              <a:rPr lang="en-US" dirty="0"/>
               <a:t>Example 1: Test Development For a New Code</a:t>
             </a:r>
           </a:p>
@@ -9498,7 +11309,7 @@
 </p:sld>
 </file>
 
-<file path=ppt/slides/slide7.xml><?xml version="1.0" encoding="utf-8"?>
+<file path=ppt/slides/slide8.xml><?xml version="1.0" encoding="utf-8"?>
 <p:sld xmlns:a="http://schemas.openxmlformats.org/drawingml/2006/main" xmlns:r="http://schemas.openxmlformats.org/officeDocument/2006/relationships" xmlns:p="http://schemas.openxmlformats.org/presentationml/2006/main">
   <p:cSld>
     <p:spTree>
@@ -11713,7 +13524,7 @@
 </p:sld>
 </file>
 
-<file path=ppt/slides/slide8.xml><?xml version="1.0" encoding="utf-8"?>
+<file path=ppt/slides/slide9.xml><?xml version="1.0" encoding="utf-8"?>
 <p:sld xmlns:a="http://schemas.openxmlformats.org/drawingml/2006/main" xmlns:r="http://schemas.openxmlformats.org/officeDocument/2006/relationships" xmlns:p="http://schemas.openxmlformats.org/presentationml/2006/main">
   <p:cSld>
     <p:spTree>
@@ -11790,7 +13601,7 @@
           <a:p>
             <a:r>
               <a:rPr lang="en-US" dirty="0"/>
-              <a:t>Bottom-up picture (shim if needed)</a:t>
+              <a:t>Bottom-up picture </a:t>
             </a:r>
           </a:p>
           <a:p>
@@ -12544,440 +14355,6 @@
 </p:sld>
 </file>
 
-<file path=ppt/slides/slide9.xml><?xml version="1.0" encoding="utf-8"?>
-<p:sld xmlns:a="http://schemas.openxmlformats.org/drawingml/2006/main" xmlns:r="http://schemas.openxmlformats.org/officeDocument/2006/relationships" xmlns:p="http://schemas.openxmlformats.org/presentationml/2006/main">
-  <p:cSld>
-    <p:spTree>
-      <p:nvGrpSpPr>
-        <p:cNvPr id="1" name=""/>
-        <p:cNvGrpSpPr/>
-        <p:nvPr/>
-      </p:nvGrpSpPr>
-      <p:grpSpPr>
-        <a:xfrm>
-          <a:off x="0" y="0"/>
-          <a:ext cx="0" cy="0"/>
-          <a:chOff x="0" y="0"/>
-          <a:chExt cx="0" cy="0"/>
-        </a:xfrm>
-      </p:grpSpPr>
-      <p:sp>
-        <p:nvSpPr>
-          <p:cNvPr id="2" name="Title 1"/>
-          <p:cNvSpPr>
-            <a:spLocks noGrp="1"/>
-          </p:cNvSpPr>
-          <p:nvPr>
-            <p:ph type="title"/>
-          </p:nvPr>
-        </p:nvSpPr>
-        <p:spPr/>
-        <p:txBody>
-          <a:bodyPr/>
-          <a:lstStyle/>
-          <a:p>
-            <a:r>
-              <a:rPr lang="en-US" dirty="0"/>
-              <a:t>Example 3: Structured Testing</a:t>
-            </a:r>
-          </a:p>
-        </p:txBody>
-      </p:sp>
-      <p:sp>
-        <p:nvSpPr>
-          <p:cNvPr id="5" name="Content Placeholder 4"/>
-          <p:cNvSpPr>
-            <a:spLocks noGrp="1"/>
-          </p:cNvSpPr>
-          <p:nvPr>
-            <p:ph sz="quarter" idx="1"/>
-          </p:nvPr>
-        </p:nvSpPr>
-        <p:spPr>
-          <a:xfrm>
-            <a:off x="496346" y="943897"/>
-            <a:ext cx="4761454" cy="4893023"/>
-          </a:xfrm>
-        </p:spPr>
-        <p:txBody>
-          <a:bodyPr/>
-          <a:lstStyle/>
-          <a:p>
-            <a:pPr marL="0" indent="0">
-              <a:buNone/>
-            </a:pPr>
-            <a:r>
-              <a:rPr lang="en-US" b="1" dirty="0"/>
-              <a:t>Unit test for Grid halo cell fill</a:t>
-            </a:r>
-          </a:p>
-          <a:p>
-            <a:r>
-              <a:rPr lang="en-US" dirty="0"/>
-              <a:t>Verification of guard/ghost/halo  cell fill</a:t>
-            </a:r>
-          </a:p>
-          <a:p>
-            <a:r>
-              <a:rPr lang="en-US" dirty="0"/>
-              <a:t>Initialize field on interior cells (red)</a:t>
-            </a:r>
-          </a:p>
-          <a:p>
-            <a:r>
-              <a:rPr lang="en-US" dirty="0"/>
-              <a:t>Apply guard cell fill</a:t>
-            </a:r>
-          </a:p>
-          <a:p>
-            <a:r>
-              <a:rPr lang="en-US" dirty="0"/>
-              <a:t>Check for equivalence with known fill pattern</a:t>
-            </a:r>
-          </a:p>
-        </p:txBody>
-      </p:sp>
-      <p:pic>
-        <p:nvPicPr>
-          <p:cNvPr id="7" name="Picture 3"/>
-          <p:cNvPicPr>
-            <a:picLocks noChangeAspect="1" noChangeArrowheads="1"/>
-          </p:cNvPicPr>
-          <p:nvPr/>
-        </p:nvPicPr>
-        <p:blipFill rotWithShape="1">
-          <a:blip r:embed="rId4" cstate="email">
-            <a:extLst>
-              <a:ext uri="{28A0092B-C50C-407E-A947-70E740481C1C}">
-                <a14:useLocalDpi xmlns:a14="http://schemas.microsoft.com/office/drawing/2010/main" val="0"/>
-              </a:ext>
-            </a:extLst>
-          </a:blip>
-          <a:srcRect t="8785" b="22588"/>
-          <a:stretch/>
-        </p:blipFill>
-        <p:spPr>
-          <a:xfrm>
-            <a:off x="5704700" y="1517589"/>
-            <a:ext cx="4960523" cy="3846313"/>
-          </a:xfrm>
-          <a:prstGeom prst="rect">
-            <a:avLst/>
-          </a:prstGeom>
-        </p:spPr>
-      </p:pic>
-      <p:sp>
-        <p:nvSpPr>
-          <p:cNvPr id="6" name="Donut 5">
-            <a:extLst>
-              <a:ext uri="{FF2B5EF4-FFF2-40B4-BE49-F238E27FC236}">
-                <a16:creationId xmlns:a16="http://schemas.microsoft.com/office/drawing/2014/main" id="{AF11DFE6-1CA6-7B47-BB91-0A4FD7EE6189}"/>
-              </a:ext>
-            </a:extLst>
-          </p:cNvPr>
-          <p:cNvSpPr/>
-          <p:nvPr/>
-        </p:nvSpPr>
-        <p:spPr>
-          <a:xfrm>
-            <a:off x="164373" y="4461000"/>
-            <a:ext cx="1847200" cy="1758821"/>
-          </a:xfrm>
-          <a:prstGeom prst="donut">
-            <a:avLst/>
-          </a:prstGeom>
-          <a:solidFill>
-            <a:schemeClr val="accent6">
-              <a:lumMod val="40000"/>
-              <a:lumOff val="60000"/>
-            </a:schemeClr>
-          </a:solidFill>
-          <a:ln>
-            <a:solidFill>
-              <a:schemeClr val="tx1"/>
-            </a:solidFill>
-          </a:ln>
-        </p:spPr>
-        <p:style>
-          <a:lnRef idx="1">
-            <a:schemeClr val="accent1"/>
-          </a:lnRef>
-          <a:fillRef idx="3">
-            <a:schemeClr val="accent1"/>
-          </a:fillRef>
-          <a:effectRef idx="2">
-            <a:schemeClr val="accent1"/>
-          </a:effectRef>
-          <a:fontRef idx="minor">
-            <a:schemeClr val="lt1"/>
-          </a:fontRef>
-        </p:style>
-        <p:txBody>
-          <a:bodyPr rtlCol="0" anchor="ctr"/>
-          <a:lstStyle/>
-          <a:p>
-            <a:pPr algn="ctr"/>
-            <a:r>
-              <a:rPr lang="en-US" dirty="0" err="1">
-                <a:solidFill>
-                  <a:schemeClr val="tx1"/>
-                </a:solidFill>
-              </a:rPr>
-              <a:t>gc</a:t>
-            </a:r>
-            <a:r>
-              <a:rPr lang="en-US" dirty="0">
-                <a:solidFill>
-                  <a:schemeClr val="tx1"/>
-                </a:solidFill>
-              </a:rPr>
-              <a:t> test</a:t>
-            </a:r>
-          </a:p>
-        </p:txBody>
-      </p:sp>
-      <p:sp>
-        <p:nvSpPr>
-          <p:cNvPr id="8" name="Donut 7">
-            <a:extLst>
-              <a:ext uri="{FF2B5EF4-FFF2-40B4-BE49-F238E27FC236}">
-                <a16:creationId xmlns:a16="http://schemas.microsoft.com/office/drawing/2014/main" id="{C8782544-B531-1D40-A502-BF7E9615BCB6}"/>
-              </a:ext>
-            </a:extLst>
-          </p:cNvPr>
-          <p:cNvSpPr/>
-          <p:nvPr/>
-        </p:nvSpPr>
-        <p:spPr>
-          <a:xfrm>
-            <a:off x="2578899" y="4460999"/>
-            <a:ext cx="1847200" cy="1758821"/>
-          </a:xfrm>
-          <a:prstGeom prst="donut">
-            <a:avLst/>
-          </a:prstGeom>
-          <a:solidFill>
-            <a:schemeClr val="accent6">
-              <a:lumMod val="40000"/>
-              <a:lumOff val="60000"/>
-            </a:schemeClr>
-          </a:solidFill>
-          <a:ln>
-            <a:solidFill>
-              <a:schemeClr val="tx1"/>
-            </a:solidFill>
-          </a:ln>
-        </p:spPr>
-        <p:style>
-          <a:lnRef idx="1">
-            <a:schemeClr val="accent1"/>
-          </a:lnRef>
-          <a:fillRef idx="3">
-            <a:schemeClr val="accent1"/>
-          </a:fillRef>
-          <a:effectRef idx="2">
-            <a:schemeClr val="accent1"/>
-          </a:effectRef>
-          <a:fontRef idx="minor">
-            <a:schemeClr val="lt1"/>
-          </a:fontRef>
-        </p:style>
-        <p:txBody>
-          <a:bodyPr rtlCol="0" anchor="ctr"/>
-          <a:lstStyle/>
-          <a:p>
-            <a:pPr algn="ctr"/>
-            <a:r>
-              <a:rPr lang="en-US" dirty="0">
-                <a:solidFill>
-                  <a:schemeClr val="tx1"/>
-                </a:solidFill>
-              </a:rPr>
-              <a:t>Eos test</a:t>
-            </a:r>
-          </a:p>
-        </p:txBody>
-      </p:sp>
-      <p:sp>
-        <p:nvSpPr>
-          <p:cNvPr id="3" name="TextBox 2">
-            <a:extLst>
-              <a:ext uri="{FF2B5EF4-FFF2-40B4-BE49-F238E27FC236}">
-                <a16:creationId xmlns:a16="http://schemas.microsoft.com/office/drawing/2014/main" id="{EA2BEC30-2CA8-E946-81D4-8C60BCD9EF89}"/>
-              </a:ext>
-            </a:extLst>
-          </p:cNvPr>
-          <p:cNvSpPr txBox="1"/>
-          <p:nvPr/>
-        </p:nvSpPr>
-        <p:spPr>
-          <a:xfrm>
-            <a:off x="1471938" y="6350589"/>
-            <a:ext cx="6229334" cy="433965"/>
-          </a:xfrm>
-          <a:prstGeom prst="rect">
-            <a:avLst/>
-          </a:prstGeom>
-          <a:noFill/>
-        </p:spPr>
-        <p:txBody>
-          <a:bodyPr wrap="none" lIns="118872" tIns="91440" rIns="118872" bIns="91440" rtlCol="0" anchor="ctr" anchorCtr="0">
-            <a:spAutoFit/>
-          </a:bodyPr>
-          <a:lstStyle/>
-          <a:p>
-            <a:pPr algn="l">
-              <a:lnSpc>
-                <a:spcPct val="90000"/>
-              </a:lnSpc>
-            </a:pPr>
-            <a:r>
-              <a:rPr lang="en-US" dirty="0"/>
-              <a:t>Next, build an EOS Test – is E(V,T) consistent with P(V,T)?</a:t>
-            </a:r>
-          </a:p>
-        </p:txBody>
-      </p:sp>
-    </p:spTree>
-    <p:custDataLst>
-      <p:tags r:id="rId1"/>
-    </p:custDataLst>
-    <p:extLst>
-      <p:ext uri="{BB962C8B-B14F-4D97-AF65-F5344CB8AC3E}">
-        <p14:creationId xmlns:p14="http://schemas.microsoft.com/office/powerpoint/2010/main" val="2442379966"/>
-      </p:ext>
-    </p:extLst>
-  </p:cSld>
-  <p:clrMapOvr>
-    <a:masterClrMapping/>
-  </p:clrMapOvr>
-  <p:timing>
-    <p:tnLst>
-      <p:par>
-        <p:cTn id="1" dur="indefinite" restart="never" nodeType="tmRoot">
-          <p:childTnLst>
-            <p:seq concurrent="1" nextAc="seek">
-              <p:cTn id="2" dur="indefinite" nodeType="mainSeq">
-                <p:childTnLst>
-                  <p:par>
-                    <p:cTn id="3" fill="hold">
-                      <p:stCondLst>
-                        <p:cond delay="indefinite"/>
-                      </p:stCondLst>
-                      <p:childTnLst>
-                        <p:par>
-                          <p:cTn id="4" fill="hold">
-                            <p:stCondLst>
-                              <p:cond delay="0"/>
-                            </p:stCondLst>
-                            <p:childTnLst>
-                              <p:par>
-                                <p:cTn id="5" presetID="1" presetClass="entr" presetSubtype="0" fill="hold" grpId="0" nodeType="clickEffect">
-                                  <p:stCondLst>
-                                    <p:cond delay="0"/>
-                                  </p:stCondLst>
-                                  <p:childTnLst>
-                                    <p:set>
-                                      <p:cBhvr>
-                                        <p:cTn id="6" dur="1" fill="hold">
-                                          <p:stCondLst>
-                                            <p:cond delay="0"/>
-                                          </p:stCondLst>
-                                        </p:cTn>
-                                        <p:tgtEl>
-                                          <p:spTgt spid="6"/>
-                                        </p:tgtEl>
-                                        <p:attrNameLst>
-                                          <p:attrName>style.visibility</p:attrName>
-                                        </p:attrNameLst>
-                                      </p:cBhvr>
-                                      <p:to>
-                                        <p:strVal val="visible"/>
-                                      </p:to>
-                                    </p:set>
-                                  </p:childTnLst>
-                                </p:cTn>
-                              </p:par>
-                            </p:childTnLst>
-                          </p:cTn>
-                        </p:par>
-                      </p:childTnLst>
-                    </p:cTn>
-                  </p:par>
-                  <p:par>
-                    <p:cTn id="7" fill="hold">
-                      <p:stCondLst>
-                        <p:cond delay="indefinite"/>
-                      </p:stCondLst>
-                      <p:childTnLst>
-                        <p:par>
-                          <p:cTn id="8" fill="hold">
-                            <p:stCondLst>
-                              <p:cond delay="0"/>
-                            </p:stCondLst>
-                            <p:childTnLst>
-                              <p:par>
-                                <p:cTn id="9" presetID="1" presetClass="entr" presetSubtype="0" fill="hold" grpId="0" nodeType="clickEffect">
-                                  <p:stCondLst>
-                                    <p:cond delay="0"/>
-                                  </p:stCondLst>
-                                  <p:childTnLst>
-                                    <p:set>
-                                      <p:cBhvr>
-                                        <p:cTn id="10" dur="1" fill="hold">
-                                          <p:stCondLst>
-                                            <p:cond delay="0"/>
-                                          </p:stCondLst>
-                                        </p:cTn>
-                                        <p:tgtEl>
-                                          <p:spTgt spid="8"/>
-                                        </p:tgtEl>
-                                        <p:attrNameLst>
-                                          <p:attrName>style.visibility</p:attrName>
-                                        </p:attrNameLst>
-                                      </p:cBhvr>
-                                      <p:to>
-                                        <p:strVal val="visible"/>
-                                      </p:to>
-                                    </p:set>
-                                  </p:childTnLst>
-                                </p:cTn>
-                              </p:par>
-                            </p:childTnLst>
-                          </p:cTn>
-                        </p:par>
-                      </p:childTnLst>
-                    </p:cTn>
-                  </p:par>
-                </p:childTnLst>
-              </p:cTn>
-              <p:prevCondLst>
-                <p:cond evt="onPrev" delay="0">
-                  <p:tgtEl>
-                    <p:sldTgt/>
-                  </p:tgtEl>
-                </p:cond>
-              </p:prevCondLst>
-              <p:nextCondLst>
-                <p:cond evt="onNext" delay="0">
-                  <p:tgtEl>
-                    <p:sldTgt/>
-                  </p:tgtEl>
-                </p:cond>
-              </p:nextCondLst>
-            </p:seq>
-          </p:childTnLst>
-        </p:cTn>
-      </p:par>
-    </p:tnLst>
-    <p:bldLst>
-      <p:bldP spid="6" grpId="0" animBg="1"/>
-      <p:bldP spid="8" grpId="0" animBg="1"/>
-    </p:bldLst>
-  </p:timing>
-</p:sld>
-</file>
-
 <file path=ppt/tags/tag1.xml><?xml version="1.0" encoding="utf-8"?>
 <p:tagLst xmlns:a="http://schemas.openxmlformats.org/drawingml/2006/main" xmlns:r="http://schemas.openxmlformats.org/officeDocument/2006/relationships" xmlns:p="http://schemas.openxmlformats.org/presentationml/2006/main">
   <p:tag name="TIMING" val="|25.8|7|19.3|5.6|9|17.8|16.3|3.9|16.6|0.7"/>
@@ -12997,6 +14374,12 @@
 </file>
 
 <file path=ppt/tags/tag4.xml><?xml version="1.0" encoding="utf-8"?>
+<p:tagLst xmlns:a="http://schemas.openxmlformats.org/drawingml/2006/main" xmlns:r="http://schemas.openxmlformats.org/officeDocument/2006/relationships" xmlns:p="http://schemas.openxmlformats.org/presentationml/2006/main">
+  <p:tag name="TIMING" val="|102|13.3"/>
+</p:tagLst>
+</file>
+
+<file path=ppt/tags/tag5.xml><?xml version="1.0" encoding="utf-8"?>
 <p:tagLst xmlns:a="http://schemas.openxmlformats.org/drawingml/2006/main" xmlns:r="http://schemas.openxmlformats.org/officeDocument/2006/relationships" xmlns:p="http://schemas.openxmlformats.org/presentationml/2006/main">
   <p:tag name="TIMING" val="|87.2|3.4|1.7|15|27"/>
 </p:tagLst>
@@ -13915,6 +15298,15 @@
 </file>
 
 <file path=customXml/item1.xml><?xml version="1.0" encoding="utf-8"?>
+<?mso-contentType ?>
+<FormTemplates xmlns="http://schemas.microsoft.com/sharepoint/v3/contenttype/forms">
+  <Display>DocumentLibraryForm</Display>
+  <Edit>DocumentLibraryForm</Edit>
+  <New>DocumentLibraryForm</New>
+</FormTemplates>
+</file>
+
+<file path=customXml/item2.xml><?xml version="1.0" encoding="utf-8"?>
 <ct:contentTypeSchema xmlns:ct="http://schemas.microsoft.com/office/2006/metadata/contentType" xmlns:ma="http://schemas.microsoft.com/office/2006/metadata/properties/metaAttributes" ct:_="" ma:_="" ma:contentTypeName="Document" ma:contentTypeID="0x010100565464437F680748A68B85EB6594EA7D" ma:contentTypeVersion="0" ma:contentTypeDescription="Create a new document." ma:contentTypeScope="" ma:versionID="fe3f4dd58d5914c51cfc6deaa8ad845c">
   <xsd:schema xmlns:xsd="http://www.w3.org/2001/XMLSchema" xmlns:p="http://schemas.microsoft.com/office/2006/metadata/properties" targetNamespace="http://schemas.microsoft.com/office/2006/metadata/properties" ma:root="true" ma:fieldsID="4aeb20c0e3442673af7ee10786458764">
     <xsd:element name="properties">
@@ -13963,15 +15355,6 @@
 </ct:contentTypeSchema>
 </file>
 
-<file path=customXml/item2.xml><?xml version="1.0" encoding="utf-8"?>
-<?mso-contentType ?>
-<FormTemplates xmlns="http://schemas.microsoft.com/sharepoint/v3/contenttype/forms">
-  <Display>DocumentLibraryForm</Display>
-  <Edit>DocumentLibraryForm</Edit>
-  <New>DocumentLibraryForm</New>
-</FormTemplates>
-</file>
-
 <file path=customXml/item3.xml><?xml version="1.0" encoding="utf-8"?>
 <p:properties xmlns:p="http://schemas.microsoft.com/office/2006/metadata/properties" xmlns:xsi="http://www.w3.org/2001/XMLSchema-instance" xmlns:pc="http://schemas.microsoft.com/office/infopath/2007/PartnerControls">
   <documentManagement/>
@@ -13979,6 +15362,14 @@
 </file>
 
 <file path=customXml/itemProps1.xml><?xml version="1.0" encoding="utf-8"?>
+<ds:datastoreItem xmlns:ds="http://schemas.openxmlformats.org/officeDocument/2006/customXml" ds:itemID="{19E20559-B232-4371-8690-E3D8007EDB82}">
+  <ds:schemaRefs>
+    <ds:schemaRef ds:uri="http://schemas.microsoft.com/sharepoint/v3/contenttype/forms"/>
+  </ds:schemaRefs>
+</ds:datastoreItem>
+</file>
+
+<file path=customXml/itemProps2.xml><?xml version="1.0" encoding="utf-8"?>
 <ds:datastoreItem xmlns:ds="http://schemas.openxmlformats.org/officeDocument/2006/customXml" ds:itemID="{E8DB7DEB-074E-4EE8-9B6E-FD277323109C}">
   <ds:schemaRefs>
     <ds:schemaRef ds:uri="http://schemas.microsoft.com/office/2006/metadata/contentType"/>
@@ -13989,14 +15380,6 @@
     <ds:schemaRef ds:uri="http://purl.org/dc/elements/1.1/"/>
     <ds:schemaRef ds:uri="http://purl.org/dc/terms/"/>
     <ds:schemaRef ds:uri="http://schemas.microsoft.com/office/internal/2005/internalDocumentation"/>
-  </ds:schemaRefs>
-</ds:datastoreItem>
-</file>
-
-<file path=customXml/itemProps2.xml><?xml version="1.0" encoding="utf-8"?>
-<ds:datastoreItem xmlns:ds="http://schemas.openxmlformats.org/officeDocument/2006/customXml" ds:itemID="{19E20559-B232-4371-8690-E3D8007EDB82}">
-  <ds:schemaRefs>
-    <ds:schemaRef ds:uri="http://schemas.microsoft.com/sharepoint/v3/contenttype/forms"/>
   </ds:schemaRefs>
 </ds:datastoreItem>
 </file>

</xml_diff>